<commit_message>
new images and recap presentation
</commit_message>
<xml_diff>
--- a/Documentation/4. Recap filters-spectrum-alignment .pptx
+++ b/Documentation/4. Recap filters-spectrum-alignment .pptx
@@ -213,7 +213,7 @@
           <a:p>
             <a:fld id="{1A21894F-B278-4D96-9594-A030EA633187}" type="datetimeFigureOut">
               <a:rPr lang="it-IT" smtClean="0"/>
-              <a:t>26/09/2024</a:t>
+              <a:t>27/09/2024</a:t>
             </a:fld>
             <a:endParaRPr lang="it-IT"/>
           </a:p>
@@ -2261,7 +2261,7 @@
           <a:p>
             <a:fld id="{58E4D78B-0F35-4E3B-A0B9-554BA787D8A4}" type="datetime1">
               <a:rPr lang="en-US" smtClean="0"/>
-              <a:t>9/26/2024</a:t>
+              <a:t>9/27/2024</a:t>
             </a:fld>
             <a:endParaRPr lang="en-US"/>
           </a:p>
@@ -2471,7 +2471,7 @@
           <a:p>
             <a:fld id="{604487E5-BE79-4BAC-AEB7-0CE0533B5E5C}" type="datetime1">
               <a:rPr lang="en-US" smtClean="0"/>
-              <a:t>9/26/2024</a:t>
+              <a:t>9/27/2024</a:t>
             </a:fld>
             <a:endParaRPr lang="en-US"/>
           </a:p>
@@ -2671,7 +2671,7 @@
           <a:p>
             <a:fld id="{DDA7E0CB-9E21-49FD-99A0-0CD75BBC45F4}" type="datetime1">
               <a:rPr lang="en-US" smtClean="0"/>
-              <a:t>9/26/2024</a:t>
+              <a:t>9/27/2024</a:t>
             </a:fld>
             <a:endParaRPr lang="en-US"/>
           </a:p>
@@ -2947,7 +2947,7 @@
           <a:p>
             <a:fld id="{661D7149-FE96-419A-8F67-9BD351842985}" type="datetime1">
               <a:rPr lang="en-US" smtClean="0"/>
-              <a:t>9/26/2024</a:t>
+              <a:t>9/27/2024</a:t>
             </a:fld>
             <a:endParaRPr lang="en-US"/>
           </a:p>
@@ -3215,7 +3215,7 @@
           <a:p>
             <a:fld id="{6CA97CEF-DD94-4A20-85BC-5094F3EA8887}" type="datetime1">
               <a:rPr lang="en-US" smtClean="0"/>
-              <a:t>9/26/2024</a:t>
+              <a:t>9/27/2024</a:t>
             </a:fld>
             <a:endParaRPr lang="en-US"/>
           </a:p>
@@ -3630,7 +3630,7 @@
           <a:p>
             <a:fld id="{9862EB4C-45F8-47BA-B435-B6097D61B684}" type="datetime1">
               <a:rPr lang="en-US" smtClean="0"/>
-              <a:t>9/26/2024</a:t>
+              <a:t>9/27/2024</a:t>
             </a:fld>
             <a:endParaRPr lang="en-US"/>
           </a:p>
@@ -3772,7 +3772,7 @@
           <a:p>
             <a:fld id="{FA7CD0E2-B7EC-4D81-9389-8F889EE865AB}" type="datetime1">
               <a:rPr lang="en-US" smtClean="0"/>
-              <a:t>9/26/2024</a:t>
+              <a:t>9/27/2024</a:t>
             </a:fld>
             <a:endParaRPr lang="en-US"/>
           </a:p>
@@ -3885,7 +3885,7 @@
           <a:p>
             <a:fld id="{18B47F5C-7FA0-44DA-BF82-413AB90208B7}" type="datetime1">
               <a:rPr lang="en-US" smtClean="0"/>
-              <a:t>9/26/2024</a:t>
+              <a:t>9/27/2024</a:t>
             </a:fld>
             <a:endParaRPr lang="en-US"/>
           </a:p>
@@ -4198,7 +4198,7 @@
           <a:p>
             <a:fld id="{403415A8-F8BD-47CC-8D20-53798396961D}" type="datetime1">
               <a:rPr lang="en-US" smtClean="0"/>
-              <a:t>9/26/2024</a:t>
+              <a:t>9/27/2024</a:t>
             </a:fld>
             <a:endParaRPr lang="en-US"/>
           </a:p>
@@ -4487,7 +4487,7 @@
           <a:p>
             <a:fld id="{6A12F5A1-6669-4CDD-B1B4-04FFE5C41ADE}" type="datetime1">
               <a:rPr lang="en-US" smtClean="0"/>
-              <a:t>9/26/2024</a:t>
+              <a:t>9/27/2024</a:t>
             </a:fld>
             <a:endParaRPr lang="en-US"/>
           </a:p>
@@ -4691,7 +4691,7 @@
           <a:p>
             <a:fld id="{63421662-C242-4258-8799-9F32C0D7CC75}" type="datetime1">
               <a:rPr lang="en-US" smtClean="0"/>
-              <a:t>9/26/2024</a:t>
+              <a:t>9/27/2024</a:t>
             </a:fld>
             <a:endParaRPr lang="en-US"/>
           </a:p>
@@ -5861,6 +5861,30 @@
           <a:p>
             <a:r>
               <a:rPr lang="en-US" sz="1400" dirty="0"/>
+              <a:t>Spectrum estimation results depends on the AR coefficients estimator </a:t>
+            </a:r>
+            <a:r>
+              <a:rPr lang="en-US" sz="1200" dirty="0">
+                <a:solidFill>
+                  <a:schemeClr val="bg2">
+                    <a:lumMod val="75000"/>
+                  </a:schemeClr>
+                </a:solidFill>
+              </a:rPr>
+              <a:t>[3,4]</a:t>
+            </a:r>
+          </a:p>
+          <a:p>
+            <a:pPr lvl="1"/>
+            <a:r>
+              <a:rPr lang="en-US" sz="1100" dirty="0"/>
+              <a:t>LS estimator has the best performance, together with Burg estimation, while Yule-Walker require high order models</a:t>
+            </a:r>
+            <a:endParaRPr lang="en-US" sz="1400" dirty="0"/>
+          </a:p>
+          <a:p>
+            <a:r>
+              <a:rPr lang="en-US" sz="1400" dirty="0"/>
               <a:t>Order choice is crucial: the model should represent well the signal</a:t>
             </a:r>
           </a:p>
@@ -5881,30 +5905,6 @@
               <a:t>[3,4]</a:t>
             </a:r>
             <a:endParaRPr lang="en-US" sz="1100" dirty="0"/>
-          </a:p>
-          <a:p>
-            <a:r>
-              <a:rPr lang="en-US" sz="1400" dirty="0"/>
-              <a:t>Spectrum estimation results depends on the AR coefficients estimator </a:t>
-            </a:r>
-            <a:r>
-              <a:rPr lang="en-US" sz="1200" dirty="0">
-                <a:solidFill>
-                  <a:schemeClr val="bg2">
-                    <a:lumMod val="75000"/>
-                  </a:schemeClr>
-                </a:solidFill>
-              </a:rPr>
-              <a:t>[3,4]</a:t>
-            </a:r>
-          </a:p>
-          <a:p>
-            <a:pPr lvl="1"/>
-            <a:r>
-              <a:rPr lang="en-US" sz="1100" dirty="0"/>
-              <a:t>LS estimator has the best performance, together with Burg estimation, while Yule-Walker require high order models</a:t>
-            </a:r>
-            <a:endParaRPr lang="en-US" sz="1400" dirty="0"/>
           </a:p>
           <a:p>
             <a:pPr marL="0" indent="0">
@@ -10864,7 +10864,115 @@
               <a:rPr lang="en-US" sz="1400" dirty="0">
                 <a:latin typeface="+mj-lt"/>
               </a:rPr>
-              <a:t>The proposed spectrum estimation pipeline has been tested on well-know external data (didactical) and compared with the more used  Spectrogram and Welch spectrogram. </a:t>
+              <a:t>The proposed spectrum estimation </a:t>
+            </a:r>
+            <a:r>
+              <a:rPr lang="en-US" sz="1400" b="1" dirty="0">
+                <a:latin typeface="+mj-lt"/>
+              </a:rPr>
+              <a:t>pipeline</a:t>
+            </a:r>
+            <a:r>
+              <a:rPr lang="en-US" sz="1400" dirty="0">
+                <a:latin typeface="+mj-lt"/>
+              </a:rPr>
+              <a:t> has been </a:t>
+            </a:r>
+            <a:r>
+              <a:rPr lang="en-US" sz="1400" b="1" dirty="0">
+                <a:latin typeface="+mj-lt"/>
+              </a:rPr>
+              <a:t>tested</a:t>
+            </a:r>
+            <a:r>
+              <a:rPr lang="en-US" sz="1400" dirty="0">
+                <a:latin typeface="+mj-lt"/>
+              </a:rPr>
+              <a:t> on well-know </a:t>
+            </a:r>
+            <a:r>
+              <a:rPr lang="en-US" sz="1400" b="1" dirty="0">
+                <a:latin typeface="+mj-lt"/>
+              </a:rPr>
+              <a:t>external</a:t>
+            </a:r>
+            <a:r>
+              <a:rPr lang="en-US" sz="1400" dirty="0">
+                <a:latin typeface="+mj-lt"/>
+              </a:rPr>
+              <a:t> </a:t>
+            </a:r>
+            <a:r>
+              <a:rPr lang="en-US" sz="1400" b="1" dirty="0">
+                <a:latin typeface="+mj-lt"/>
+              </a:rPr>
+              <a:t>data</a:t>
+            </a:r>
+            <a:r>
+              <a:rPr lang="en-US" sz="1400" dirty="0">
+                <a:latin typeface="+mj-lt"/>
+              </a:rPr>
+              <a:t> (</a:t>
+            </a:r>
+            <a:r>
+              <a:rPr lang="en-US" sz="1400" b="1" dirty="0">
+                <a:latin typeface="+mj-lt"/>
+              </a:rPr>
+              <a:t>didactical</a:t>
+            </a:r>
+            <a:r>
+              <a:rPr lang="en-US" sz="1400" dirty="0">
+                <a:latin typeface="+mj-lt"/>
+              </a:rPr>
+              <a:t>) and </a:t>
+            </a:r>
+            <a:r>
+              <a:rPr lang="en-US" sz="1400" b="1" dirty="0">
+                <a:latin typeface="+mj-lt"/>
+              </a:rPr>
+              <a:t>compared</a:t>
+            </a:r>
+            <a:r>
+              <a:rPr lang="en-US" sz="1400" dirty="0">
+                <a:latin typeface="+mj-lt"/>
+              </a:rPr>
+              <a:t> </a:t>
+            </a:r>
+            <a:r>
+              <a:rPr lang="en-US" sz="1400" b="1" dirty="0">
+                <a:latin typeface="+mj-lt"/>
+              </a:rPr>
+              <a:t>with</a:t>
+            </a:r>
+            <a:r>
+              <a:rPr lang="en-US" sz="1400" dirty="0">
+                <a:latin typeface="+mj-lt"/>
+              </a:rPr>
+              <a:t> the more used  </a:t>
+            </a:r>
+            <a:r>
+              <a:rPr lang="en-US" sz="1400" b="1" dirty="0">
+                <a:latin typeface="+mj-lt"/>
+              </a:rPr>
+              <a:t>Spectrogram</a:t>
+            </a:r>
+            <a:r>
+              <a:rPr lang="en-US" sz="1400" dirty="0">
+                <a:latin typeface="+mj-lt"/>
+              </a:rPr>
+              <a:t> and </a:t>
+            </a:r>
+            <a:r>
+              <a:rPr lang="en-US" sz="1400" b="1" dirty="0">
+                <a:latin typeface="+mj-lt"/>
+              </a:rPr>
+              <a:t>Welch</a:t>
+            </a:r>
+            <a:r>
+              <a:rPr lang="en-US" sz="1400" dirty="0">
+                <a:latin typeface="+mj-lt"/>
+              </a:rPr>
+              <a:t> spectrogram. </a:t>
             </a:r>
           </a:p>
           <a:p>
@@ -13946,7 +14054,7 @@
             <a:pPr lvl="1"/>
             <a:r>
               <a:rPr lang="en-US" sz="1000" dirty="0"/>
-              <a:t>It’s possible that the QRS is recorded inside, at least, one spare trace</a:t>
+              <a:t>Is it possible that the QRS is recorded at least inside one spare trace?</a:t>
             </a:r>
           </a:p>
           <a:p>
@@ -15736,7 +15844,7 @@
             </a:pPr>
             <a:r>
               <a:rPr lang="en-US" sz="1400" dirty="0"/>
-              <a:t>Here, an example of aligned traces is reported. These traces are related to subjects in whom the ref trace presented a clear QRS.</a:t>
+              <a:t>Here, an example of aligned traces is reported. These traces are related to subjects in whom the ref trace presented a clear QRS (sub: 1,2,4,6,11).</a:t>
             </a:r>
           </a:p>
           <a:p>
@@ -15933,7 +16041,7 @@
       </p:pic>
       <p:pic>
         <p:nvPicPr>
-          <p:cNvPr id="12" name="Immagine 11" descr="Immagine che contiene linea, diagramma, Parallelo&#10;&#10;Descrizione generata automaticamente">
+          <p:cNvPr id="12" name="Immagine 11">
             <a:extLst>
               <a:ext uri="{FF2B5EF4-FFF2-40B4-BE49-F238E27FC236}">
                 <a16:creationId xmlns:a16="http://schemas.microsoft.com/office/drawing/2014/main" id="{FCCA4871-C84B-D9EC-7093-B58EFC058BC9}"/>
@@ -15953,13 +16061,13 @@
               </a:ext>
             </a:extLst>
           </a:blip>
-          <a:srcRect l="9300" t="2809" r="8800" b="5775"/>
+          <a:srcRect l="8631" r="10640"/>
           <a:stretch/>
         </p:blipFill>
         <p:spPr>
           <a:xfrm>
-            <a:off x="5651839" y="1581912"/>
-            <a:ext cx="6183899" cy="4032504"/>
+            <a:off x="5494021" y="1581912"/>
+            <a:ext cx="6341718" cy="4032504"/>
           </a:xfrm>
           <a:prstGeom prst="rect">
             <a:avLst/>

</xml_diff>

<commit_message>
modification in recap pptx
</commit_message>
<xml_diff>
--- a/Documentation/4. Recap filters-spectrum-alignment .pptx
+++ b/Documentation/4. Recap filters-spectrum-alignment .pptx
@@ -5,7 +5,7 @@
     <p:sldMasterId id="2147483661" r:id="rId1"/>
   </p:sldMasterIdLst>
   <p:notesMasterIdLst>
-    <p:notesMasterId r:id="rId19"/>
+    <p:notesMasterId r:id="rId22"/>
   </p:notesMasterIdLst>
   <p:sldIdLst>
     <p:sldId id="573" r:id="rId2"/>
@@ -23,8 +23,11 @@
     <p:sldId id="652" r:id="rId14"/>
     <p:sldId id="636" r:id="rId15"/>
     <p:sldId id="648" r:id="rId16"/>
-    <p:sldId id="653" r:id="rId17"/>
-    <p:sldId id="600" r:id="rId18"/>
+    <p:sldId id="655" r:id="rId17"/>
+    <p:sldId id="654" r:id="rId18"/>
+    <p:sldId id="653" r:id="rId19"/>
+    <p:sldId id="600" r:id="rId20"/>
+    <p:sldId id="577" r:id="rId21"/>
   </p:sldIdLst>
   <p:sldSz cx="12192000" cy="6858000"/>
   <p:notesSz cx="6858000" cy="9144000"/>
@@ -213,7 +216,7 @@
           <a:p>
             <a:fld id="{1A21894F-B278-4D96-9594-A030EA633187}" type="datetimeFigureOut">
               <a:rPr lang="it-IT" smtClean="0"/>
-              <a:t>27/09/2024</a:t>
+              <a:t>02/10/2024</a:t>
             </a:fld>
             <a:endParaRPr lang="it-IT"/>
           </a:p>
@@ -1058,7 +1061,7 @@
     </p:spTree>
     <p:extLst>
       <p:ext uri="{BB962C8B-B14F-4D97-AF65-F5344CB8AC3E}">
-        <p14:creationId xmlns:p14="http://schemas.microsoft.com/office/powerpoint/2010/main" val="2672806015"/>
+        <p14:creationId xmlns:p14="http://schemas.microsoft.com/office/powerpoint/2010/main" val="754583960"/>
       </p:ext>
     </p:extLst>
   </p:cSld>
@@ -1135,6 +1138,174 @@
               <a:rPr lang="en-US" smtClean="0"/>
               <a:t>17</a:t>
             </a:fld>
+            <a:endParaRPr lang="en-US" dirty="0"/>
+          </a:p>
+        </p:txBody>
+      </p:sp>
+    </p:spTree>
+    <p:extLst>
+      <p:ext uri="{BB962C8B-B14F-4D97-AF65-F5344CB8AC3E}">
+        <p14:creationId xmlns:p14="http://schemas.microsoft.com/office/powerpoint/2010/main" val="44108696"/>
+      </p:ext>
+    </p:extLst>
+  </p:cSld>
+  <p:clrMapOvr>
+    <a:masterClrMapping/>
+  </p:clrMapOvr>
+</p:notes>
+</file>
+
+<file path=ppt/notesSlides/notesSlide17.xml><?xml version="1.0" encoding="utf-8"?>
+<p:notes xmlns:a="http://schemas.openxmlformats.org/drawingml/2006/main" xmlns:r="http://schemas.openxmlformats.org/officeDocument/2006/relationships" xmlns:p="http://schemas.openxmlformats.org/presentationml/2006/main">
+  <p:cSld>
+    <p:spTree>
+      <p:nvGrpSpPr>
+        <p:cNvPr id="1" name=""/>
+        <p:cNvGrpSpPr/>
+        <p:nvPr/>
+      </p:nvGrpSpPr>
+      <p:grpSpPr>
+        <a:xfrm>
+          <a:off x="0" y="0"/>
+          <a:ext cx="0" cy="0"/>
+          <a:chOff x="0" y="0"/>
+          <a:chExt cx="0" cy="0"/>
+        </a:xfrm>
+      </p:grpSpPr>
+      <p:sp>
+        <p:nvSpPr>
+          <p:cNvPr id="2" name="Segnaposto immagine diapositiva 1"/>
+          <p:cNvSpPr>
+            <a:spLocks noGrp="1" noRot="1" noChangeAspect="1"/>
+          </p:cNvSpPr>
+          <p:nvPr>
+            <p:ph type="sldImg"/>
+          </p:nvPr>
+        </p:nvSpPr>
+        <p:spPr/>
+      </p:sp>
+      <p:sp>
+        <p:nvSpPr>
+          <p:cNvPr id="3" name="Segnaposto note 2"/>
+          <p:cNvSpPr>
+            <a:spLocks noGrp="1"/>
+          </p:cNvSpPr>
+          <p:nvPr>
+            <p:ph type="body" idx="1"/>
+          </p:nvPr>
+        </p:nvSpPr>
+        <p:spPr/>
+        <p:txBody>
+          <a:bodyPr/>
+          <a:lstStyle/>
+          <a:p>
+            <a:endParaRPr lang="en-US" dirty="0"/>
+          </a:p>
+        </p:txBody>
+      </p:sp>
+      <p:sp>
+        <p:nvSpPr>
+          <p:cNvPr id="4" name="Segnaposto numero diapositiva 3"/>
+          <p:cNvSpPr>
+            <a:spLocks noGrp="1"/>
+          </p:cNvSpPr>
+          <p:nvPr>
+            <p:ph type="sldNum" sz="quarter" idx="5"/>
+          </p:nvPr>
+        </p:nvSpPr>
+        <p:spPr/>
+        <p:txBody>
+          <a:bodyPr/>
+          <a:lstStyle/>
+          <a:p>
+            <a:fld id="{802E5CB9-2BE2-4860-85EE-BBFABBF2603A}" type="slidenum">
+              <a:rPr lang="en-US" smtClean="0"/>
+              <a:t>18</a:t>
+            </a:fld>
+            <a:endParaRPr lang="en-US" dirty="0"/>
+          </a:p>
+        </p:txBody>
+      </p:sp>
+    </p:spTree>
+    <p:extLst>
+      <p:ext uri="{BB962C8B-B14F-4D97-AF65-F5344CB8AC3E}">
+        <p14:creationId xmlns:p14="http://schemas.microsoft.com/office/powerpoint/2010/main" val="2672806015"/>
+      </p:ext>
+    </p:extLst>
+  </p:cSld>
+  <p:clrMapOvr>
+    <a:masterClrMapping/>
+  </p:clrMapOvr>
+</p:notes>
+</file>
+
+<file path=ppt/notesSlides/notesSlide18.xml><?xml version="1.0" encoding="utf-8"?>
+<p:notes xmlns:a="http://schemas.openxmlformats.org/drawingml/2006/main" xmlns:r="http://schemas.openxmlformats.org/officeDocument/2006/relationships" xmlns:p="http://schemas.openxmlformats.org/presentationml/2006/main">
+  <p:cSld>
+    <p:spTree>
+      <p:nvGrpSpPr>
+        <p:cNvPr id="1" name=""/>
+        <p:cNvGrpSpPr/>
+        <p:nvPr/>
+      </p:nvGrpSpPr>
+      <p:grpSpPr>
+        <a:xfrm>
+          <a:off x="0" y="0"/>
+          <a:ext cx="0" cy="0"/>
+          <a:chOff x="0" y="0"/>
+          <a:chExt cx="0" cy="0"/>
+        </a:xfrm>
+      </p:grpSpPr>
+      <p:sp>
+        <p:nvSpPr>
+          <p:cNvPr id="2" name="Segnaposto immagine diapositiva 1"/>
+          <p:cNvSpPr>
+            <a:spLocks noGrp="1" noRot="1" noChangeAspect="1"/>
+          </p:cNvSpPr>
+          <p:nvPr>
+            <p:ph type="sldImg"/>
+          </p:nvPr>
+        </p:nvSpPr>
+        <p:spPr/>
+      </p:sp>
+      <p:sp>
+        <p:nvSpPr>
+          <p:cNvPr id="3" name="Segnaposto note 2"/>
+          <p:cNvSpPr>
+            <a:spLocks noGrp="1"/>
+          </p:cNvSpPr>
+          <p:nvPr>
+            <p:ph type="body" idx="1"/>
+          </p:nvPr>
+        </p:nvSpPr>
+        <p:spPr/>
+        <p:txBody>
+          <a:bodyPr/>
+          <a:lstStyle/>
+          <a:p>
+            <a:endParaRPr lang="en-US" dirty="0"/>
+          </a:p>
+        </p:txBody>
+      </p:sp>
+      <p:sp>
+        <p:nvSpPr>
+          <p:cNvPr id="4" name="Segnaposto numero diapositiva 3"/>
+          <p:cNvSpPr>
+            <a:spLocks noGrp="1"/>
+          </p:cNvSpPr>
+          <p:nvPr>
+            <p:ph type="sldNum" sz="quarter" idx="5"/>
+          </p:nvPr>
+        </p:nvSpPr>
+        <p:spPr/>
+        <p:txBody>
+          <a:bodyPr/>
+          <a:lstStyle/>
+          <a:p>
+            <a:fld id="{802E5CB9-2BE2-4860-85EE-BBFABBF2603A}" type="slidenum">
+              <a:rPr lang="en-US" smtClean="0"/>
+              <a:t>19</a:t>
+            </a:fld>
             <a:endParaRPr lang="en-US"/>
           </a:p>
         </p:txBody>
@@ -1143,6 +1314,90 @@
     <p:extLst>
       <p:ext uri="{BB962C8B-B14F-4D97-AF65-F5344CB8AC3E}">
         <p14:creationId xmlns:p14="http://schemas.microsoft.com/office/powerpoint/2010/main" val="846966909"/>
+      </p:ext>
+    </p:extLst>
+  </p:cSld>
+  <p:clrMapOvr>
+    <a:masterClrMapping/>
+  </p:clrMapOvr>
+</p:notes>
+</file>
+
+<file path=ppt/notesSlides/notesSlide19.xml><?xml version="1.0" encoding="utf-8"?>
+<p:notes xmlns:a="http://schemas.openxmlformats.org/drawingml/2006/main" xmlns:r="http://schemas.openxmlformats.org/officeDocument/2006/relationships" xmlns:p="http://schemas.openxmlformats.org/presentationml/2006/main">
+  <p:cSld>
+    <p:spTree>
+      <p:nvGrpSpPr>
+        <p:cNvPr id="1" name=""/>
+        <p:cNvGrpSpPr/>
+        <p:nvPr/>
+      </p:nvGrpSpPr>
+      <p:grpSpPr>
+        <a:xfrm>
+          <a:off x="0" y="0"/>
+          <a:ext cx="0" cy="0"/>
+          <a:chOff x="0" y="0"/>
+          <a:chExt cx="0" cy="0"/>
+        </a:xfrm>
+      </p:grpSpPr>
+      <p:sp>
+        <p:nvSpPr>
+          <p:cNvPr id="2" name="Segnaposto immagine diapositiva 1"/>
+          <p:cNvSpPr>
+            <a:spLocks noGrp="1" noRot="1" noChangeAspect="1"/>
+          </p:cNvSpPr>
+          <p:nvPr>
+            <p:ph type="sldImg"/>
+          </p:nvPr>
+        </p:nvSpPr>
+        <p:spPr/>
+      </p:sp>
+      <p:sp>
+        <p:nvSpPr>
+          <p:cNvPr id="3" name="Segnaposto note 2"/>
+          <p:cNvSpPr>
+            <a:spLocks noGrp="1"/>
+          </p:cNvSpPr>
+          <p:nvPr>
+            <p:ph type="body" idx="1"/>
+          </p:nvPr>
+        </p:nvSpPr>
+        <p:spPr/>
+        <p:txBody>
+          <a:bodyPr/>
+          <a:lstStyle/>
+          <a:p>
+            <a:endParaRPr lang="en-US" dirty="0"/>
+          </a:p>
+        </p:txBody>
+      </p:sp>
+      <p:sp>
+        <p:nvSpPr>
+          <p:cNvPr id="4" name="Segnaposto numero diapositiva 3"/>
+          <p:cNvSpPr>
+            <a:spLocks noGrp="1"/>
+          </p:cNvSpPr>
+          <p:nvPr>
+            <p:ph type="sldNum" sz="quarter" idx="5"/>
+          </p:nvPr>
+        </p:nvSpPr>
+        <p:spPr/>
+        <p:txBody>
+          <a:bodyPr/>
+          <a:lstStyle/>
+          <a:p>
+            <a:fld id="{802E5CB9-2BE2-4860-85EE-BBFABBF2603A}" type="slidenum">
+              <a:rPr lang="en-US" smtClean="0"/>
+              <a:t>20</a:t>
+            </a:fld>
+            <a:endParaRPr lang="en-US"/>
+          </a:p>
+        </p:txBody>
+      </p:sp>
+    </p:spTree>
+    <p:extLst>
+      <p:ext uri="{BB962C8B-B14F-4D97-AF65-F5344CB8AC3E}">
+        <p14:creationId xmlns:p14="http://schemas.microsoft.com/office/powerpoint/2010/main" val="2399769669"/>
       </p:ext>
     </p:extLst>
   </p:cSld>
@@ -2261,7 +2516,7 @@
           <a:p>
             <a:fld id="{58E4D78B-0F35-4E3B-A0B9-554BA787D8A4}" type="datetime1">
               <a:rPr lang="en-US" smtClean="0"/>
-              <a:t>9/27/2024</a:t>
+              <a:t>10/2/2024</a:t>
             </a:fld>
             <a:endParaRPr lang="en-US"/>
           </a:p>
@@ -2471,7 +2726,7 @@
           <a:p>
             <a:fld id="{604487E5-BE79-4BAC-AEB7-0CE0533B5E5C}" type="datetime1">
               <a:rPr lang="en-US" smtClean="0"/>
-              <a:t>9/27/2024</a:t>
+              <a:t>10/2/2024</a:t>
             </a:fld>
             <a:endParaRPr lang="en-US"/>
           </a:p>
@@ -2671,7 +2926,7 @@
           <a:p>
             <a:fld id="{DDA7E0CB-9E21-49FD-99A0-0CD75BBC45F4}" type="datetime1">
               <a:rPr lang="en-US" smtClean="0"/>
-              <a:t>9/27/2024</a:t>
+              <a:t>10/2/2024</a:t>
             </a:fld>
             <a:endParaRPr lang="en-US"/>
           </a:p>
@@ -2947,7 +3202,7 @@
           <a:p>
             <a:fld id="{661D7149-FE96-419A-8F67-9BD351842985}" type="datetime1">
               <a:rPr lang="en-US" smtClean="0"/>
-              <a:t>9/27/2024</a:t>
+              <a:t>10/2/2024</a:t>
             </a:fld>
             <a:endParaRPr lang="en-US"/>
           </a:p>
@@ -3215,7 +3470,7 @@
           <a:p>
             <a:fld id="{6CA97CEF-DD94-4A20-85BC-5094F3EA8887}" type="datetime1">
               <a:rPr lang="en-US" smtClean="0"/>
-              <a:t>9/27/2024</a:t>
+              <a:t>10/2/2024</a:t>
             </a:fld>
             <a:endParaRPr lang="en-US"/>
           </a:p>
@@ -3630,7 +3885,7 @@
           <a:p>
             <a:fld id="{9862EB4C-45F8-47BA-B435-B6097D61B684}" type="datetime1">
               <a:rPr lang="en-US" smtClean="0"/>
-              <a:t>9/27/2024</a:t>
+              <a:t>10/2/2024</a:t>
             </a:fld>
             <a:endParaRPr lang="en-US"/>
           </a:p>
@@ -3772,7 +4027,7 @@
           <a:p>
             <a:fld id="{FA7CD0E2-B7EC-4D81-9389-8F889EE865AB}" type="datetime1">
               <a:rPr lang="en-US" smtClean="0"/>
-              <a:t>9/27/2024</a:t>
+              <a:t>10/2/2024</a:t>
             </a:fld>
             <a:endParaRPr lang="en-US"/>
           </a:p>
@@ -3885,7 +4140,7 @@
           <a:p>
             <a:fld id="{18B47F5C-7FA0-44DA-BF82-413AB90208B7}" type="datetime1">
               <a:rPr lang="en-US" smtClean="0"/>
-              <a:t>9/27/2024</a:t>
+              <a:t>10/2/2024</a:t>
             </a:fld>
             <a:endParaRPr lang="en-US"/>
           </a:p>
@@ -4198,7 +4453,7 @@
           <a:p>
             <a:fld id="{403415A8-F8BD-47CC-8D20-53798396961D}" type="datetime1">
               <a:rPr lang="en-US" smtClean="0"/>
-              <a:t>9/27/2024</a:t>
+              <a:t>10/2/2024</a:t>
             </a:fld>
             <a:endParaRPr lang="en-US"/>
           </a:p>
@@ -4487,7 +4742,7 @@
           <a:p>
             <a:fld id="{6A12F5A1-6669-4CDD-B1B4-04FFE5C41ADE}" type="datetime1">
               <a:rPr lang="en-US" smtClean="0"/>
-              <a:t>9/27/2024</a:t>
+              <a:t>10/2/2024</a:t>
             </a:fld>
             <a:endParaRPr lang="en-US"/>
           </a:p>
@@ -4691,7 +4946,7 @@
           <a:p>
             <a:fld id="{63421662-C242-4258-8799-9F32C0D7CC75}" type="datetime1">
               <a:rPr lang="en-US" smtClean="0"/>
-              <a:t>9/27/2024</a:t>
+              <a:t>10/2/2024</a:t>
             </a:fld>
             <a:endParaRPr lang="en-US"/>
           </a:p>
@@ -11087,7 +11342,7 @@
               <a:rPr lang="en-US" sz="1400" dirty="0">
                 <a:latin typeface="+mj-lt"/>
               </a:rPr>
-              <a:t>Burg and LS estimators converge</a:t>
+              <a:t>Burg and LS estimators converge, but AR spectrums, Welch spectrums and spectrograms does not lead to comparable results. </a:t>
             </a:r>
           </a:p>
           <a:p>
@@ -11119,6 +11374,17 @@
                 <a:latin typeface="+mj-lt"/>
               </a:rPr>
               <a:t>. </a:t>
+            </a:r>
+          </a:p>
+          <a:p>
+            <a:pPr marL="0" indent="0">
+              <a:buNone/>
+            </a:pPr>
+            <a:r>
+              <a:rPr lang="en-US" sz="1400" dirty="0">
+                <a:latin typeface="+mj-lt"/>
+              </a:rPr>
+              <a:t>Spectrum estimation is still an open problem to be investigated in the future. </a:t>
             </a:r>
           </a:p>
           <a:p>
@@ -11163,7 +11429,7 @@
         </p:blipFill>
         <p:spPr>
           <a:xfrm>
-            <a:off x="358016" y="4799657"/>
+            <a:off x="433196" y="4983790"/>
             <a:ext cx="3720208" cy="1346294"/>
           </a:xfrm>
           <a:prstGeom prst="rect">
@@ -11198,7 +11464,7 @@
         </p:blipFill>
         <p:spPr>
           <a:xfrm>
-            <a:off x="4569525" y="1483469"/>
+            <a:off x="4614918" y="1483469"/>
             <a:ext cx="7449256" cy="4469462"/>
           </a:xfrm>
           <a:prstGeom prst="rect">
@@ -11899,14 +12165,99 @@
                                 </p:cTn>
                               </p:par>
                               <p:par>
-                                <p:cTn id="32" presetID="10" presetClass="exit" presetSubtype="0" fill="hold" nodeType="withEffect">
+                                <p:cTn id="32" presetID="2" presetClass="entr" presetSubtype="4" fill="hold" nodeType="withEffect">
+                                  <p:stCondLst>
+                                    <p:cond delay="0"/>
+                                  </p:stCondLst>
+                                  <p:childTnLst>
+                                    <p:set>
+                                      <p:cBhvr>
+                                        <p:cTn id="33" dur="1" fill="hold">
+                                          <p:stCondLst>
+                                            <p:cond delay="0"/>
+                                          </p:stCondLst>
+                                        </p:cTn>
+                                        <p:tgtEl>
+                                          <p:spTgt spid="22">
+                                            <p:txEl>
+                                              <p:pRg st="5" end="5"/>
+                                            </p:txEl>
+                                          </p:spTgt>
+                                        </p:tgtEl>
+                                        <p:attrNameLst>
+                                          <p:attrName>style.visibility</p:attrName>
+                                        </p:attrNameLst>
+                                      </p:cBhvr>
+                                      <p:to>
+                                        <p:strVal val="visible"/>
+                                      </p:to>
+                                    </p:set>
+                                    <p:anim calcmode="lin" valueType="num">
+                                      <p:cBhvr additive="base">
+                                        <p:cTn id="34" dur="500" fill="hold"/>
+                                        <p:tgtEl>
+                                          <p:spTgt spid="22">
+                                            <p:txEl>
+                                              <p:pRg st="5" end="5"/>
+                                            </p:txEl>
+                                          </p:spTgt>
+                                        </p:tgtEl>
+                                        <p:attrNameLst>
+                                          <p:attrName>ppt_x</p:attrName>
+                                        </p:attrNameLst>
+                                      </p:cBhvr>
+                                      <p:tavLst>
+                                        <p:tav tm="0">
+                                          <p:val>
+                                            <p:strVal val="#ppt_x"/>
+                                          </p:val>
+                                        </p:tav>
+                                        <p:tav tm="100000">
+                                          <p:val>
+                                            <p:strVal val="#ppt_x"/>
+                                          </p:val>
+                                        </p:tav>
+                                      </p:tavLst>
+                                    </p:anim>
+                                    <p:anim calcmode="lin" valueType="num">
+                                      <p:cBhvr additive="base">
+                                        <p:cTn id="35" dur="500" fill="hold"/>
+                                        <p:tgtEl>
+                                          <p:spTgt spid="22">
+                                            <p:txEl>
+                                              <p:pRg st="5" end="5"/>
+                                            </p:txEl>
+                                          </p:spTgt>
+                                        </p:tgtEl>
+                                        <p:attrNameLst>
+                                          <p:attrName>ppt_y</p:attrName>
+                                        </p:attrNameLst>
+                                      </p:cBhvr>
+                                      <p:tavLst>
+                                        <p:tav tm="0">
+                                          <p:val>
+                                            <p:strVal val="1+#ppt_h/2"/>
+                                          </p:val>
+                                        </p:tav>
+                                        <p:tav tm="100000">
+                                          <p:val>
+                                            <p:strVal val="#ppt_y"/>
+                                          </p:val>
+                                        </p:tav>
+                                      </p:tavLst>
+                                    </p:anim>
+                                  </p:childTnLst>
+                                </p:cTn>
+                              </p:par>
+                              <p:par>
+                                <p:cTn id="36" presetID="10" presetClass="exit" presetSubtype="0" fill="hold" nodeType="withEffect">
                                   <p:stCondLst>
                                     <p:cond delay="0"/>
                                   </p:stCondLst>
                                   <p:childTnLst>
                                     <p:animEffect transition="out" filter="fade">
                                       <p:cBhvr>
-                                        <p:cTn id="33" dur="500"/>
+                                        <p:cTn id="37" dur="500"/>
                                         <p:tgtEl>
                                           <p:spTgt spid="7"/>
                                         </p:tgtEl>
@@ -11914,7 +12265,7 @@
                                     </p:animEffect>
                                     <p:set>
                                       <p:cBhvr>
-                                        <p:cTn id="34" dur="1" fill="hold">
+                                        <p:cTn id="38" dur="1" fill="hold">
                                           <p:stCondLst>
                                             <p:cond delay="499"/>
                                           </p:stCondLst>
@@ -11934,14 +12285,14 @@
                                 </p:cTn>
                               </p:par>
                               <p:par>
-                                <p:cTn id="35" presetID="6" presetClass="entr" presetSubtype="32" fill="hold" nodeType="withEffect">
+                                <p:cTn id="39" presetID="6" presetClass="entr" presetSubtype="32" fill="hold" nodeType="withEffect">
                                   <p:stCondLst>
                                     <p:cond delay="0"/>
                                   </p:stCondLst>
                                   <p:childTnLst>
                                     <p:set>
                                       <p:cBhvr>
-                                        <p:cTn id="36" dur="1" fill="hold">
+                                        <p:cTn id="40" dur="1" fill="hold">
                                           <p:stCondLst>
                                             <p:cond delay="0"/>
                                           </p:stCondLst>
@@ -11959,7 +12310,7 @@
                                     </p:set>
                                     <p:animEffect transition="in" filter="circle(out)">
                                       <p:cBhvr>
-                                        <p:cTn id="37" dur="500"/>
+                                        <p:cTn id="41" dur="500"/>
                                         <p:tgtEl>
                                           <p:spTgt spid="12"/>
                                         </p:tgtEl>
@@ -13844,6 +14195,19 @@
               <a:rPr lang="en-US" sz="2000" dirty="0"/>
               <a:t>Signals alignment </a:t>
             </a:r>
+          </a:p>
+          <a:p>
+            <a:r>
+              <a:rPr lang="en-US" sz="2000" dirty="0">
+                <a:solidFill>
+                  <a:schemeClr val="bg2">
+                    <a:lumMod val="75000"/>
+                  </a:schemeClr>
+                </a:solidFill>
+              </a:rPr>
+              <a:t>Possible features of Rov Signals</a:t>
+            </a:r>
+            <a:endParaRPr lang="en-US" sz="2000" dirty="0"/>
           </a:p>
           <a:p>
             <a:r>
@@ -15844,7 +16208,7 @@
             </a:pPr>
             <a:r>
               <a:rPr lang="en-US" sz="1400" dirty="0"/>
-              <a:t>Here, an example of aligned traces is reported. These traces are related to subjects in whom the ref trace presented a clear QRS (sub: 1,2,4,6,11).</a:t>
+              <a:t>Here, examples of aligned traces are reported. These traces are related to subjects in whom the ref trace presented a clear QRS (sub: 1,2,4,6,11).</a:t>
             </a:r>
           </a:p>
           <a:p>
@@ -16039,41 +16403,6 @@
           </a:prstGeom>
         </p:spPr>
       </p:pic>
-      <p:pic>
-        <p:nvPicPr>
-          <p:cNvPr id="12" name="Immagine 11">
-            <a:extLst>
-              <a:ext uri="{FF2B5EF4-FFF2-40B4-BE49-F238E27FC236}">
-                <a16:creationId xmlns:a16="http://schemas.microsoft.com/office/drawing/2014/main" id="{FCCA4871-C84B-D9EC-7093-B58EFC058BC9}"/>
-              </a:ext>
-            </a:extLst>
-          </p:cNvPr>
-          <p:cNvPicPr>
-            <a:picLocks noChangeAspect="1"/>
-          </p:cNvPicPr>
-          <p:nvPr/>
-        </p:nvPicPr>
-        <p:blipFill>
-          <a:blip r:embed="rId7">
-            <a:extLst>
-              <a:ext uri="{28A0092B-C50C-407E-A947-70E740481C1C}">
-                <a14:useLocalDpi xmlns:a14="http://schemas.microsoft.com/office/drawing/2010/main" val="0"/>
-              </a:ext>
-            </a:extLst>
-          </a:blip>
-          <a:srcRect l="8631" r="10640"/>
-          <a:stretch/>
-        </p:blipFill>
-        <p:spPr>
-          <a:xfrm>
-            <a:off x="5494021" y="1581912"/>
-            <a:ext cx="6341718" cy="4032504"/>
-          </a:xfrm>
-          <a:prstGeom prst="rect">
-            <a:avLst/>
-          </a:prstGeom>
-        </p:spPr>
-      </p:pic>
       <p:sp>
         <p:nvSpPr>
           <p:cNvPr id="14" name="CasellaDiTesto 13">
@@ -16251,6 +16580,111 @@
           </a:p>
         </p:txBody>
       </p:sp>
+      <p:pic>
+        <p:nvPicPr>
+          <p:cNvPr id="15" name="Immagine 14" descr="Immagine che contiene testo, diagramma, linea, Parallelo&#10;&#10;Descrizione generata automaticamente">
+            <a:extLst>
+              <a:ext uri="{FF2B5EF4-FFF2-40B4-BE49-F238E27FC236}">
+                <a16:creationId xmlns:a16="http://schemas.microsoft.com/office/drawing/2014/main" id="{FB95BBDA-74A6-1CA2-F953-B31291778721}"/>
+              </a:ext>
+            </a:extLst>
+          </p:cNvPr>
+          <p:cNvPicPr>
+            <a:picLocks noChangeAspect="1"/>
+          </p:cNvPicPr>
+          <p:nvPr/>
+        </p:nvPicPr>
+        <p:blipFill>
+          <a:blip r:embed="rId7">
+            <a:extLst>
+              <a:ext uri="{28A0092B-C50C-407E-A947-70E740481C1C}">
+                <a14:useLocalDpi xmlns:a14="http://schemas.microsoft.com/office/drawing/2010/main" val="0"/>
+              </a:ext>
+            </a:extLst>
+          </a:blip>
+          <a:srcRect l="9074" t="3325" r="8800" b="4813"/>
+          <a:stretch/>
+        </p:blipFill>
+        <p:spPr>
+          <a:xfrm>
+            <a:off x="5324475" y="1474327"/>
+            <a:ext cx="6511263" cy="4140089"/>
+          </a:xfrm>
+          <a:prstGeom prst="rect">
+            <a:avLst/>
+          </a:prstGeom>
+        </p:spPr>
+      </p:pic>
+      <p:pic>
+        <p:nvPicPr>
+          <p:cNvPr id="17" name="Immagine 16" descr="Immagine che contiene testo, diagramma, linea, Parallelo&#10;&#10;Descrizione generata automaticamente">
+            <a:extLst>
+              <a:ext uri="{FF2B5EF4-FFF2-40B4-BE49-F238E27FC236}">
+                <a16:creationId xmlns:a16="http://schemas.microsoft.com/office/drawing/2014/main" id="{E05B6878-3288-E260-FDF8-301C87803F83}"/>
+              </a:ext>
+            </a:extLst>
+          </p:cNvPr>
+          <p:cNvPicPr>
+            <a:picLocks noChangeAspect="1"/>
+          </p:cNvPicPr>
+          <p:nvPr/>
+        </p:nvPicPr>
+        <p:blipFill>
+          <a:blip r:embed="rId8">
+            <a:extLst>
+              <a:ext uri="{28A0092B-C50C-407E-A947-70E740481C1C}">
+                <a14:useLocalDpi xmlns:a14="http://schemas.microsoft.com/office/drawing/2010/main" val="0"/>
+              </a:ext>
+            </a:extLst>
+          </a:blip>
+          <a:srcRect l="8782" r="7156" b="3778"/>
+          <a:stretch/>
+        </p:blipFill>
+        <p:spPr>
+          <a:xfrm>
+            <a:off x="5324474" y="1474327"/>
+            <a:ext cx="6511262" cy="4140089"/>
+          </a:xfrm>
+          <a:prstGeom prst="rect">
+            <a:avLst/>
+          </a:prstGeom>
+        </p:spPr>
+      </p:pic>
+      <p:pic>
+        <p:nvPicPr>
+          <p:cNvPr id="11" name="Immagine 10" descr="Immagine che contiene testo, diagramma, Parallelo, linea&#10;&#10;Descrizione generata automaticamente">
+            <a:extLst>
+              <a:ext uri="{FF2B5EF4-FFF2-40B4-BE49-F238E27FC236}">
+                <a16:creationId xmlns:a16="http://schemas.microsoft.com/office/drawing/2014/main" id="{C37C05F7-6920-8DFE-1FC5-100D247A6118}"/>
+              </a:ext>
+            </a:extLst>
+          </p:cNvPr>
+          <p:cNvPicPr>
+            <a:picLocks noChangeAspect="1"/>
+          </p:cNvPicPr>
+          <p:nvPr/>
+        </p:nvPicPr>
+        <p:blipFill>
+          <a:blip r:embed="rId9">
+            <a:extLst>
+              <a:ext uri="{28A0092B-C50C-407E-A947-70E740481C1C}">
+                <a14:useLocalDpi xmlns:a14="http://schemas.microsoft.com/office/drawing/2010/main" val="0"/>
+              </a:ext>
+            </a:extLst>
+          </a:blip>
+          <a:srcRect l="8376" r="8703" b="4660"/>
+          <a:stretch/>
+        </p:blipFill>
+        <p:spPr>
+          <a:xfrm>
+            <a:off x="5324472" y="1581912"/>
+            <a:ext cx="6358512" cy="3968496"/>
+          </a:xfrm>
+          <a:prstGeom prst="rect">
+            <a:avLst/>
+          </a:prstGeom>
+        </p:spPr>
+      </p:pic>
     </p:spTree>
     <p:extLst>
       <p:ext uri="{BB962C8B-B14F-4D97-AF65-F5344CB8AC3E}">
@@ -17002,7 +17436,7 @@
                                           </p:stCondLst>
                                         </p:cTn>
                                         <p:tgtEl>
-                                          <p:spTgt spid="12"/>
+                                          <p:spTgt spid="15"/>
                                         </p:tgtEl>
                                         <p:attrNameLst>
                                           <p:attrName>style.visibility</p:attrName>
@@ -17016,7 +17450,113 @@
                                       <p:cBhvr>
                                         <p:cTn id="53" dur="500"/>
                                         <p:tgtEl>
-                                          <p:spTgt spid="12"/>
+                                          <p:spTgt spid="15"/>
+                                        </p:tgtEl>
+                                      </p:cBhvr>
+                                    </p:animEffect>
+                                  </p:childTnLst>
+                                </p:cTn>
+                              </p:par>
+                            </p:childTnLst>
+                          </p:cTn>
+                        </p:par>
+                      </p:childTnLst>
+                    </p:cTn>
+                  </p:par>
+                  <p:par>
+                    <p:cTn id="54" fill="hold">
+                      <p:stCondLst>
+                        <p:cond delay="indefinite"/>
+                      </p:stCondLst>
+                      <p:childTnLst>
+                        <p:par>
+                          <p:cTn id="55" fill="hold">
+                            <p:stCondLst>
+                              <p:cond delay="0"/>
+                            </p:stCondLst>
+                            <p:childTnLst>
+                              <p:par>
+                                <p:cTn id="56" presetID="6" presetClass="entr" presetSubtype="32" fill="hold" nodeType="clickEffect">
+                                  <p:stCondLst>
+                                    <p:cond delay="0"/>
+                                  </p:stCondLst>
+                                  <p:childTnLst>
+                                    <p:set>
+                                      <p:cBhvr>
+                                        <p:cTn id="57" dur="1" fill="hold">
+                                          <p:stCondLst>
+                                            <p:cond delay="0"/>
+                                          </p:stCondLst>
+                                        </p:cTn>
+                                        <p:tgtEl>
+                                          <p:spTgt spid="17"/>
+                                        </p:tgtEl>
+                                        <p:attrNameLst>
+                                          <p:attrName>style.visibility</p:attrName>
+                                        </p:attrNameLst>
+                                      </p:cBhvr>
+                                      <p:to>
+                                        <p:strVal val="visible"/>
+                                      </p:to>
+                                    </p:set>
+                                    <p:animEffect transition="in" filter="circle(out)">
+                                      <p:cBhvr>
+                                        <p:cTn id="58" dur="500"/>
+                                        <p:tgtEl>
+                                          <p:spTgt spid="17"/>
+                                        </p:tgtEl>
+                                      </p:cBhvr>
+                                    </p:animEffect>
+                                  </p:childTnLst>
+                                </p:cTn>
+                              </p:par>
+                            </p:childTnLst>
+                          </p:cTn>
+                        </p:par>
+                      </p:childTnLst>
+                    </p:cTn>
+                  </p:par>
+                  <p:par>
+                    <p:cTn id="59" fill="hold">
+                      <p:stCondLst>
+                        <p:cond delay="indefinite"/>
+                      </p:stCondLst>
+                      <p:childTnLst>
+                        <p:par>
+                          <p:cTn id="60" fill="hold">
+                            <p:stCondLst>
+                              <p:cond delay="0"/>
+                            </p:stCondLst>
+                            <p:childTnLst>
+                              <p:par>
+                                <p:cTn id="61" presetID="6" presetClass="entr" presetSubtype="32" fill="hold" nodeType="clickEffect">
+                                  <p:stCondLst>
+                                    <p:cond delay="0"/>
+                                  </p:stCondLst>
+                                  <p:childTnLst>
+                                    <p:set>
+                                      <p:cBhvr>
+                                        <p:cTn id="62" dur="1" fill="hold">
+                                          <p:stCondLst>
+                                            <p:cond delay="0"/>
+                                          </p:stCondLst>
+                                        </p:cTn>
+                                        <p:tgtEl>
+                                          <p:spTgt spid="11"/>
+                                        </p:tgtEl>
+                                        <p:attrNameLst>
+                                          <p:attrName>style.visibility</p:attrName>
+                                        </p:attrNameLst>
+                                      </p:cBhvr>
+                                      <p:to>
+                                        <p:strVal val="visible"/>
+                                      </p:to>
+                                    </p:set>
+                                    <p:animEffect transition="in" filter="circle(out)">
+                                      <p:cBhvr>
+                                        <p:cTn id="63" dur="500"/>
+                                        <p:tgtEl>
+                                          <p:spTgt spid="11"/>
                                         </p:tgtEl>
                                       </p:cBhvr>
                                     </p:animEffect>
@@ -17177,9 +17717,27 @@
           <a:p>
             <a:r>
               <a:rPr lang="en-US" sz="2000" dirty="0"/>
+              <a:t>Possible features of Rov Signals</a:t>
+            </a:r>
+          </a:p>
+          <a:p>
+            <a:r>
+              <a:rPr lang="en-US" sz="2000" dirty="0">
+                <a:solidFill>
+                  <a:schemeClr val="bg2">
+                    <a:lumMod val="75000"/>
+                  </a:schemeClr>
+                </a:solidFill>
+              </a:rPr>
               <a:t>Conclusions</a:t>
             </a:r>
-            <a:endParaRPr lang="en-US" sz="1600" dirty="0"/>
+            <a:endParaRPr lang="en-US" sz="1600" dirty="0">
+              <a:solidFill>
+                <a:schemeClr val="bg2">
+                  <a:lumMod val="75000"/>
+                </a:schemeClr>
+              </a:solidFill>
+            </a:endParaRPr>
           </a:p>
           <a:p>
             <a:pPr marL="0" indent="0">
@@ -17227,6 +17785,1408 @@
     </p:spTree>
     <p:extLst>
       <p:ext uri="{BB962C8B-B14F-4D97-AF65-F5344CB8AC3E}">
+        <p14:creationId xmlns:p14="http://schemas.microsoft.com/office/powerpoint/2010/main" val="2934877484"/>
+      </p:ext>
+    </p:extLst>
+  </p:cSld>
+  <p:clrMapOvr>
+    <a:masterClrMapping/>
+  </p:clrMapOvr>
+</p:sld>
+</file>
+
+<file path=ppt/slides/slide17.xml><?xml version="1.0" encoding="utf-8"?>
+<p:sld xmlns:a="http://schemas.openxmlformats.org/drawingml/2006/main" xmlns:r="http://schemas.openxmlformats.org/officeDocument/2006/relationships" xmlns:p="http://schemas.openxmlformats.org/presentationml/2006/main">
+  <p:cSld>
+    <p:spTree>
+      <p:nvGrpSpPr>
+        <p:cNvPr id="1" name=""/>
+        <p:cNvGrpSpPr/>
+        <p:nvPr/>
+      </p:nvGrpSpPr>
+      <p:grpSpPr>
+        <a:xfrm>
+          <a:off x="0" y="0"/>
+          <a:ext cx="0" cy="0"/>
+          <a:chOff x="0" y="0"/>
+          <a:chExt cx="0" cy="0"/>
+        </a:xfrm>
+      </p:grpSpPr>
+      <p:sp>
+        <p:nvSpPr>
+          <p:cNvPr id="2" name="Titolo 1">
+            <a:extLst>
+              <a:ext uri="{FF2B5EF4-FFF2-40B4-BE49-F238E27FC236}">
+                <a16:creationId xmlns:a16="http://schemas.microsoft.com/office/drawing/2014/main" id="{90F52EA4-9809-985C-8A8C-85AEDD39AF3B}"/>
+              </a:ext>
+            </a:extLst>
+          </p:cNvPr>
+          <p:cNvSpPr>
+            <a:spLocks noGrp="1"/>
+          </p:cNvSpPr>
+          <p:nvPr>
+            <p:ph type="title"/>
+          </p:nvPr>
+        </p:nvSpPr>
+        <p:spPr/>
+        <p:txBody>
+          <a:bodyPr>
+            <a:normAutofit/>
+          </a:bodyPr>
+          <a:lstStyle/>
+          <a:p>
+            <a:r>
+              <a:rPr lang="en-US" dirty="0"/>
+              <a:t>Next step: feature extraction</a:t>
+            </a:r>
+          </a:p>
+        </p:txBody>
+      </p:sp>
+      <p:sp>
+        <p:nvSpPr>
+          <p:cNvPr id="4" name="Segnaposto numero diapositiva 3">
+            <a:extLst>
+              <a:ext uri="{FF2B5EF4-FFF2-40B4-BE49-F238E27FC236}">
+                <a16:creationId xmlns:a16="http://schemas.microsoft.com/office/drawing/2014/main" id="{8B351BE6-1815-C162-224E-864AC8EF79D2}"/>
+              </a:ext>
+            </a:extLst>
+          </p:cNvPr>
+          <p:cNvSpPr>
+            <a:spLocks noGrp="1"/>
+          </p:cNvSpPr>
+          <p:nvPr>
+            <p:ph type="sldNum" sz="quarter" idx="12"/>
+          </p:nvPr>
+        </p:nvSpPr>
+        <p:spPr/>
+        <p:txBody>
+          <a:bodyPr/>
+          <a:lstStyle/>
+          <a:p>
+            <a:fld id="{2FA0223F-D95A-431D-9A71-EDA7FA0C2F5B}" type="slidenum">
+              <a:rPr lang="en-US" smtClean="0"/>
+              <a:t>17</a:t>
+            </a:fld>
+            <a:endParaRPr lang="en-US" dirty="0"/>
+          </a:p>
+        </p:txBody>
+      </p:sp>
+      <p:grpSp>
+        <p:nvGrpSpPr>
+          <p:cNvPr id="54" name="Gruppo 53">
+            <a:extLst>
+              <a:ext uri="{FF2B5EF4-FFF2-40B4-BE49-F238E27FC236}">
+                <a16:creationId xmlns:a16="http://schemas.microsoft.com/office/drawing/2014/main" id="{9E06AA3F-076A-2673-F826-E44292F1891F}"/>
+              </a:ext>
+            </a:extLst>
+          </p:cNvPr>
+          <p:cNvGrpSpPr/>
+          <p:nvPr/>
+        </p:nvGrpSpPr>
+        <p:grpSpPr>
+          <a:xfrm>
+            <a:off x="1125357" y="1496568"/>
+            <a:ext cx="1456226" cy="3195879"/>
+            <a:chOff x="1125357" y="1496568"/>
+            <a:chExt cx="1456226" cy="3195879"/>
+          </a:xfrm>
+        </p:grpSpPr>
+        <p:sp>
+          <p:nvSpPr>
+            <p:cNvPr id="11" name="Rettangolo con angoli arrotondati 10">
+              <a:extLst>
+                <a:ext uri="{FF2B5EF4-FFF2-40B4-BE49-F238E27FC236}">
+                  <a16:creationId xmlns:a16="http://schemas.microsoft.com/office/drawing/2014/main" id="{2336BD84-5355-8F9A-C0C3-9CB37C0F8203}"/>
+                </a:ext>
+              </a:extLst>
+            </p:cNvPr>
+            <p:cNvSpPr/>
+            <p:nvPr/>
+          </p:nvSpPr>
+          <p:spPr>
+            <a:xfrm>
+              <a:off x="1275112" y="1496568"/>
+              <a:ext cx="1156717" cy="396240"/>
+            </a:xfrm>
+            <a:prstGeom prst="roundRect">
+              <a:avLst/>
+            </a:prstGeom>
+            <a:solidFill>
+              <a:schemeClr val="bg1">
+                <a:lumMod val="85000"/>
+              </a:schemeClr>
+            </a:solidFill>
+          </p:spPr>
+          <p:style>
+            <a:lnRef idx="2">
+              <a:schemeClr val="accent1">
+                <a:shade val="15000"/>
+              </a:schemeClr>
+            </a:lnRef>
+            <a:fillRef idx="1">
+              <a:schemeClr val="accent1"/>
+            </a:fillRef>
+            <a:effectRef idx="0">
+              <a:schemeClr val="accent1"/>
+            </a:effectRef>
+            <a:fontRef idx="minor">
+              <a:schemeClr val="lt1"/>
+            </a:fontRef>
+          </p:style>
+          <p:txBody>
+            <a:bodyPr rtlCol="0" anchor="ctr"/>
+            <a:lstStyle/>
+            <a:p>
+              <a:pPr algn="ctr"/>
+              <a:r>
+                <a:rPr lang="en-GB" sz="1600" dirty="0">
+                  <a:solidFill>
+                    <a:schemeClr val="tx1"/>
+                  </a:solidFill>
+                </a:rPr>
+                <a:t>Rov signals</a:t>
+              </a:r>
+            </a:p>
+          </p:txBody>
+        </p:sp>
+        <p:sp>
+          <p:nvSpPr>
+            <p:cNvPr id="15" name="Rettangolo con angoli arrotondati 14">
+              <a:extLst>
+                <a:ext uri="{FF2B5EF4-FFF2-40B4-BE49-F238E27FC236}">
+                  <a16:creationId xmlns:a16="http://schemas.microsoft.com/office/drawing/2014/main" id="{3062AAC1-A5AA-347D-5D77-8AA0F4E4D6CE}"/>
+                </a:ext>
+              </a:extLst>
+            </p:cNvPr>
+            <p:cNvSpPr/>
+            <p:nvPr/>
+          </p:nvSpPr>
+          <p:spPr>
+            <a:xfrm>
+              <a:off x="1125357" y="2106427"/>
+              <a:ext cx="1456226" cy="594359"/>
+            </a:xfrm>
+            <a:prstGeom prst="roundRect">
+              <a:avLst/>
+            </a:prstGeom>
+            <a:solidFill>
+              <a:schemeClr val="bg1">
+                <a:lumMod val="85000"/>
+              </a:schemeClr>
+            </a:solidFill>
+          </p:spPr>
+          <p:style>
+            <a:lnRef idx="2">
+              <a:schemeClr val="accent1">
+                <a:shade val="15000"/>
+              </a:schemeClr>
+            </a:lnRef>
+            <a:fillRef idx="1">
+              <a:schemeClr val="accent1"/>
+            </a:fillRef>
+            <a:effectRef idx="0">
+              <a:schemeClr val="accent1"/>
+            </a:effectRef>
+            <a:fontRef idx="minor">
+              <a:schemeClr val="lt1"/>
+            </a:fontRef>
+          </p:style>
+          <p:txBody>
+            <a:bodyPr rtlCol="0" anchor="ctr"/>
+            <a:lstStyle/>
+            <a:p>
+              <a:pPr algn="ctr"/>
+              <a:r>
+                <a:rPr lang="en-GB" sz="1400" dirty="0">
+                  <a:solidFill>
+                    <a:schemeClr val="tx1"/>
+                  </a:solidFill>
+                </a:rPr>
+                <a:t>Filter and normalize</a:t>
+              </a:r>
+            </a:p>
+          </p:txBody>
+        </p:sp>
+        <p:sp>
+          <p:nvSpPr>
+            <p:cNvPr id="17" name="Rettangolo con angoli arrotondati 16">
+              <a:extLst>
+                <a:ext uri="{FF2B5EF4-FFF2-40B4-BE49-F238E27FC236}">
+                  <a16:creationId xmlns:a16="http://schemas.microsoft.com/office/drawing/2014/main" id="{EA5E9B29-6A75-BF6D-CACC-C88725571748}"/>
+                </a:ext>
+              </a:extLst>
+            </p:cNvPr>
+            <p:cNvSpPr/>
+            <p:nvPr/>
+          </p:nvSpPr>
+          <p:spPr>
+            <a:xfrm>
+              <a:off x="1175671" y="2914405"/>
+              <a:ext cx="1372766" cy="796794"/>
+            </a:xfrm>
+            <a:prstGeom prst="roundRect">
+              <a:avLst/>
+            </a:prstGeom>
+            <a:solidFill>
+              <a:schemeClr val="bg1">
+                <a:lumMod val="85000"/>
+              </a:schemeClr>
+            </a:solidFill>
+          </p:spPr>
+          <p:style>
+            <a:lnRef idx="2">
+              <a:schemeClr val="accent1">
+                <a:shade val="15000"/>
+              </a:schemeClr>
+            </a:lnRef>
+            <a:fillRef idx="1">
+              <a:schemeClr val="accent1"/>
+            </a:fillRef>
+            <a:effectRef idx="0">
+              <a:schemeClr val="accent1"/>
+            </a:effectRef>
+            <a:fontRef idx="minor">
+              <a:schemeClr val="lt1"/>
+            </a:fontRef>
+          </p:style>
+          <p:txBody>
+            <a:bodyPr rtlCol="0" anchor="ctr"/>
+            <a:lstStyle/>
+            <a:p>
+              <a:pPr algn="ctr"/>
+              <a:r>
+                <a:rPr lang="en-GB" sz="1400" dirty="0">
+                  <a:solidFill>
+                    <a:schemeClr val="tx1"/>
+                  </a:solidFill>
+                </a:rPr>
+                <a:t>Alignment respect to a common point</a:t>
+              </a:r>
+            </a:p>
+          </p:txBody>
+        </p:sp>
+        <p:sp>
+          <p:nvSpPr>
+            <p:cNvPr id="19" name="Rettangolo con angoli arrotondati 18">
+              <a:extLst>
+                <a:ext uri="{FF2B5EF4-FFF2-40B4-BE49-F238E27FC236}">
+                  <a16:creationId xmlns:a16="http://schemas.microsoft.com/office/drawing/2014/main" id="{5C634635-0EA5-7980-4E85-AA70F5C4A423}"/>
+                </a:ext>
+              </a:extLst>
+            </p:cNvPr>
+            <p:cNvSpPr/>
+            <p:nvPr/>
+          </p:nvSpPr>
+          <p:spPr>
+            <a:xfrm>
+              <a:off x="1217401" y="3939888"/>
+              <a:ext cx="1289306" cy="752559"/>
+            </a:xfrm>
+            <a:prstGeom prst="roundRect">
+              <a:avLst/>
+            </a:prstGeom>
+            <a:solidFill>
+              <a:schemeClr val="accent5">
+                <a:lumMod val="40000"/>
+                <a:lumOff val="60000"/>
+              </a:schemeClr>
+            </a:solidFill>
+            <a:ln>
+              <a:solidFill>
+                <a:schemeClr val="accent5">
+                  <a:lumMod val="60000"/>
+                  <a:lumOff val="40000"/>
+                </a:schemeClr>
+              </a:solidFill>
+            </a:ln>
+          </p:spPr>
+          <p:style>
+            <a:lnRef idx="2">
+              <a:schemeClr val="accent1">
+                <a:shade val="15000"/>
+              </a:schemeClr>
+            </a:lnRef>
+            <a:fillRef idx="1">
+              <a:schemeClr val="accent1"/>
+            </a:fillRef>
+            <a:effectRef idx="0">
+              <a:schemeClr val="accent1"/>
+            </a:effectRef>
+            <a:fontRef idx="minor">
+              <a:schemeClr val="lt1"/>
+            </a:fontRef>
+          </p:style>
+          <p:txBody>
+            <a:bodyPr rtlCol="0" anchor="ctr"/>
+            <a:lstStyle/>
+            <a:p>
+              <a:pPr algn="ctr"/>
+              <a:r>
+                <a:rPr lang="en-GB" sz="1400" dirty="0">
+                  <a:solidFill>
+                    <a:schemeClr val="tx1"/>
+                  </a:solidFill>
+                </a:rPr>
+                <a:t>Feature extraction on Rov records</a:t>
+              </a:r>
+            </a:p>
+          </p:txBody>
+        </p:sp>
+        <p:cxnSp>
+          <p:nvCxnSpPr>
+            <p:cNvPr id="21" name="Connettore 2 20">
+              <a:extLst>
+                <a:ext uri="{FF2B5EF4-FFF2-40B4-BE49-F238E27FC236}">
+                  <a16:creationId xmlns:a16="http://schemas.microsoft.com/office/drawing/2014/main" id="{9B2DA998-5A34-C1C3-607B-5FA5AF96A4E2}"/>
+                </a:ext>
+              </a:extLst>
+            </p:cNvPr>
+            <p:cNvCxnSpPr>
+              <a:cxnSpLocks/>
+              <a:stCxn id="11" idx="2"/>
+              <a:endCxn id="15" idx="0"/>
+            </p:cNvCxnSpPr>
+            <p:nvPr/>
+          </p:nvCxnSpPr>
+          <p:spPr>
+            <a:xfrm flipH="1">
+              <a:off x="1853470" y="1892808"/>
+              <a:ext cx="1" cy="213619"/>
+            </a:xfrm>
+            <a:prstGeom prst="straightConnector1">
+              <a:avLst/>
+            </a:prstGeom>
+            <a:ln w="19050" cap="flat" cmpd="sng" algn="ctr">
+              <a:solidFill>
+                <a:schemeClr val="dk1"/>
+              </a:solidFill>
+              <a:prstDash val="solid"/>
+              <a:round/>
+              <a:headEnd type="none" w="med" len="med"/>
+              <a:tailEnd type="arrow" w="med" len="med"/>
+            </a:ln>
+          </p:spPr>
+          <p:style>
+            <a:lnRef idx="0">
+              <a:scrgbClr r="0" g="0" b="0"/>
+            </a:lnRef>
+            <a:fillRef idx="0">
+              <a:scrgbClr r="0" g="0" b="0"/>
+            </a:fillRef>
+            <a:effectRef idx="0">
+              <a:scrgbClr r="0" g="0" b="0"/>
+            </a:effectRef>
+            <a:fontRef idx="minor">
+              <a:schemeClr val="tx1"/>
+            </a:fontRef>
+          </p:style>
+        </p:cxnSp>
+        <p:cxnSp>
+          <p:nvCxnSpPr>
+            <p:cNvPr id="22" name="Connettore 2 21">
+              <a:extLst>
+                <a:ext uri="{FF2B5EF4-FFF2-40B4-BE49-F238E27FC236}">
+                  <a16:creationId xmlns:a16="http://schemas.microsoft.com/office/drawing/2014/main" id="{BC17FDCD-0967-B7C3-6488-4B7E8AFC70DF}"/>
+                </a:ext>
+              </a:extLst>
+            </p:cNvPr>
+            <p:cNvCxnSpPr>
+              <a:cxnSpLocks/>
+              <a:stCxn id="15" idx="2"/>
+              <a:endCxn id="17" idx="0"/>
+            </p:cNvCxnSpPr>
+            <p:nvPr/>
+          </p:nvCxnSpPr>
+          <p:spPr>
+            <a:xfrm>
+              <a:off x="1853470" y="2700786"/>
+              <a:ext cx="8584" cy="213619"/>
+            </a:xfrm>
+            <a:prstGeom prst="straightConnector1">
+              <a:avLst/>
+            </a:prstGeom>
+            <a:ln w="19050" cap="flat" cmpd="sng" algn="ctr">
+              <a:solidFill>
+                <a:schemeClr val="dk1"/>
+              </a:solidFill>
+              <a:prstDash val="solid"/>
+              <a:round/>
+              <a:headEnd type="none" w="med" len="med"/>
+              <a:tailEnd type="arrow" w="med" len="med"/>
+            </a:ln>
+          </p:spPr>
+          <p:style>
+            <a:lnRef idx="0">
+              <a:scrgbClr r="0" g="0" b="0"/>
+            </a:lnRef>
+            <a:fillRef idx="0">
+              <a:scrgbClr r="0" g="0" b="0"/>
+            </a:fillRef>
+            <a:effectRef idx="0">
+              <a:scrgbClr r="0" g="0" b="0"/>
+            </a:effectRef>
+            <a:fontRef idx="minor">
+              <a:schemeClr val="tx1"/>
+            </a:fontRef>
+          </p:style>
+        </p:cxnSp>
+        <p:cxnSp>
+          <p:nvCxnSpPr>
+            <p:cNvPr id="23" name="Connettore 2 22">
+              <a:extLst>
+                <a:ext uri="{FF2B5EF4-FFF2-40B4-BE49-F238E27FC236}">
+                  <a16:creationId xmlns:a16="http://schemas.microsoft.com/office/drawing/2014/main" id="{3FE6A7EC-1029-54FD-170C-D9436E3DD698}"/>
+                </a:ext>
+              </a:extLst>
+            </p:cNvPr>
+            <p:cNvCxnSpPr>
+              <a:cxnSpLocks/>
+              <a:stCxn id="17" idx="2"/>
+              <a:endCxn id="19" idx="0"/>
+            </p:cNvCxnSpPr>
+            <p:nvPr/>
+          </p:nvCxnSpPr>
+          <p:spPr>
+            <a:xfrm>
+              <a:off x="1862054" y="3711199"/>
+              <a:ext cx="0" cy="228689"/>
+            </a:xfrm>
+            <a:prstGeom prst="straightConnector1">
+              <a:avLst/>
+            </a:prstGeom>
+            <a:ln w="19050" cap="flat" cmpd="sng" algn="ctr">
+              <a:solidFill>
+                <a:schemeClr val="dk1"/>
+              </a:solidFill>
+              <a:prstDash val="solid"/>
+              <a:round/>
+              <a:headEnd type="none" w="med" len="med"/>
+              <a:tailEnd type="arrow" w="med" len="med"/>
+            </a:ln>
+          </p:spPr>
+          <p:style>
+            <a:lnRef idx="0">
+              <a:scrgbClr r="0" g="0" b="0"/>
+            </a:lnRef>
+            <a:fillRef idx="0">
+              <a:scrgbClr r="0" g="0" b="0"/>
+            </a:fillRef>
+            <a:effectRef idx="0">
+              <a:scrgbClr r="0" g="0" b="0"/>
+            </a:effectRef>
+            <a:fontRef idx="minor">
+              <a:schemeClr val="tx1"/>
+            </a:fontRef>
+          </p:style>
+        </p:cxnSp>
+      </p:grpSp>
+      <p:sp>
+        <p:nvSpPr>
+          <p:cNvPr id="55" name="Rettangolo con angoli arrotondati 54">
+            <a:extLst>
+              <a:ext uri="{FF2B5EF4-FFF2-40B4-BE49-F238E27FC236}">
+                <a16:creationId xmlns:a16="http://schemas.microsoft.com/office/drawing/2014/main" id="{CD75B860-77AE-0105-98C7-666595AB54D1}"/>
+              </a:ext>
+            </a:extLst>
+          </p:cNvPr>
+          <p:cNvSpPr/>
+          <p:nvPr/>
+        </p:nvSpPr>
+        <p:spPr>
+          <a:xfrm>
+            <a:off x="4590288" y="1496568"/>
+            <a:ext cx="5650992" cy="4759608"/>
+          </a:xfrm>
+          <a:prstGeom prst="roundRect">
+            <a:avLst>
+              <a:gd name="adj" fmla="val 6485"/>
+            </a:avLst>
+          </a:prstGeom>
+          <a:noFill/>
+          <a:ln w="19050" cap="flat" cmpd="sng" algn="ctr">
+            <a:solidFill>
+              <a:schemeClr val="accent5">
+                <a:lumMod val="75000"/>
+              </a:schemeClr>
+            </a:solidFill>
+            <a:prstDash val="solid"/>
+            <a:round/>
+            <a:headEnd type="none" w="med" len="med"/>
+            <a:tailEnd type="none" w="med" len="med"/>
+          </a:ln>
+        </p:spPr>
+        <p:style>
+          <a:lnRef idx="0">
+            <a:scrgbClr r="0" g="0" b="0"/>
+          </a:lnRef>
+          <a:fillRef idx="0">
+            <a:scrgbClr r="0" g="0" b="0"/>
+          </a:fillRef>
+          <a:effectRef idx="0">
+            <a:scrgbClr r="0" g="0" b="0"/>
+          </a:effectRef>
+          <a:fontRef idx="minor">
+            <a:schemeClr val="dk1"/>
+          </a:fontRef>
+        </p:style>
+        <p:txBody>
+          <a:bodyPr rtlCol="0" anchor="ctr"/>
+          <a:lstStyle/>
+          <a:p>
+            <a:pPr algn="ctr"/>
+            <a:endParaRPr lang="it-IT"/>
+          </a:p>
+        </p:txBody>
+      </p:sp>
+      <p:sp>
+        <p:nvSpPr>
+          <p:cNvPr id="57" name="Rettangolo con angoli arrotondati 56">
+            <a:extLst>
+              <a:ext uri="{FF2B5EF4-FFF2-40B4-BE49-F238E27FC236}">
+                <a16:creationId xmlns:a16="http://schemas.microsoft.com/office/drawing/2014/main" id="{238C7C33-68E1-C03C-5665-14A17947D6AA}"/>
+              </a:ext>
+            </a:extLst>
+          </p:cNvPr>
+          <p:cNvSpPr/>
+          <p:nvPr/>
+        </p:nvSpPr>
+        <p:spPr>
+          <a:xfrm>
+            <a:off x="4703466" y="1593599"/>
+            <a:ext cx="5437230" cy="1502288"/>
+          </a:xfrm>
+          <a:prstGeom prst="roundRect">
+            <a:avLst/>
+          </a:prstGeom>
+          <a:solidFill>
+            <a:schemeClr val="accent4">
+              <a:lumMod val="20000"/>
+              <a:lumOff val="80000"/>
+            </a:schemeClr>
+          </a:solidFill>
+          <a:ln w="19050" cap="flat" cmpd="sng" algn="ctr">
+            <a:solidFill>
+              <a:schemeClr val="accent4">
+                <a:lumMod val="60000"/>
+                <a:lumOff val="40000"/>
+              </a:schemeClr>
+            </a:solidFill>
+            <a:prstDash val="solid"/>
+            <a:round/>
+            <a:headEnd type="none" w="med" len="med"/>
+            <a:tailEnd type="none" w="med" len="med"/>
+          </a:ln>
+        </p:spPr>
+        <p:style>
+          <a:lnRef idx="0">
+            <a:scrgbClr r="0" g="0" b="0"/>
+          </a:lnRef>
+          <a:fillRef idx="0">
+            <a:scrgbClr r="0" g="0" b="0"/>
+          </a:fillRef>
+          <a:effectRef idx="0">
+            <a:scrgbClr r="0" g="0" b="0"/>
+          </a:effectRef>
+          <a:fontRef idx="minor">
+            <a:schemeClr val="dk1"/>
+          </a:fontRef>
+        </p:style>
+        <p:txBody>
+          <a:bodyPr rtlCol="0" anchor="t"/>
+          <a:lstStyle/>
+          <a:p>
+            <a:pPr algn="ctr"/>
+            <a:r>
+              <a:rPr lang="en-GB" b="1" dirty="0"/>
+              <a:t>Morphological features (time domain)</a:t>
+            </a:r>
+          </a:p>
+          <a:p>
+            <a:pPr marL="285750" indent="-285750">
+              <a:buFont typeface="Arial" panose="020B0604020202020204" pitchFamily="34" charset="0"/>
+              <a:buChar char="•"/>
+            </a:pPr>
+            <a:r>
+              <a:rPr lang="en-GB" dirty="0"/>
+              <a:t>Points of the signal, even sub-sampled </a:t>
+            </a:r>
+            <a:r>
+              <a:rPr lang="en-GB" sz="1600" dirty="0">
+                <a:solidFill>
+                  <a:schemeClr val="bg2">
+                    <a:lumMod val="75000"/>
+                  </a:schemeClr>
+                </a:solidFill>
+              </a:rPr>
+              <a:t>[9]</a:t>
+            </a:r>
+            <a:endParaRPr lang="en-GB" dirty="0">
+              <a:solidFill>
+                <a:schemeClr val="bg2">
+                  <a:lumMod val="75000"/>
+                </a:schemeClr>
+              </a:solidFill>
+            </a:endParaRPr>
+          </a:p>
+          <a:p>
+            <a:pPr marL="285750" indent="-285750">
+              <a:buFont typeface="Arial" panose="020B0604020202020204" pitchFamily="34" charset="0"/>
+              <a:buChar char="•"/>
+            </a:pPr>
+            <a:r>
+              <a:rPr lang="en-GB" dirty="0"/>
+              <a:t>Fragmentation (number of peaks of the signal) </a:t>
+            </a:r>
+            <a:r>
+              <a:rPr lang="en-GB" sz="1600" dirty="0">
+                <a:solidFill>
+                  <a:schemeClr val="bg2">
+                    <a:lumMod val="75000"/>
+                  </a:schemeClr>
+                </a:solidFill>
+              </a:rPr>
+              <a:t>[10]</a:t>
+            </a:r>
+          </a:p>
+          <a:p>
+            <a:pPr marL="285750" indent="-285750">
+              <a:buFont typeface="Arial" panose="020B0604020202020204" pitchFamily="34" charset="0"/>
+              <a:buChar char="•"/>
+            </a:pPr>
+            <a:r>
+              <a:rPr lang="en-GB" dirty="0"/>
+              <a:t>PCA/ICA representations of the signal </a:t>
+            </a:r>
+            <a:r>
+              <a:rPr lang="en-GB" sz="1600" dirty="0">
+                <a:solidFill>
+                  <a:schemeClr val="bg2">
+                    <a:lumMod val="75000"/>
+                  </a:schemeClr>
+                </a:solidFill>
+              </a:rPr>
+              <a:t>[9]</a:t>
+            </a:r>
+            <a:endParaRPr lang="en-GB" dirty="0">
+              <a:solidFill>
+                <a:schemeClr val="bg2">
+                  <a:lumMod val="75000"/>
+                </a:schemeClr>
+              </a:solidFill>
+            </a:endParaRPr>
+          </a:p>
+          <a:p>
+            <a:endParaRPr lang="en-GB" dirty="0"/>
+          </a:p>
+          <a:p>
+            <a:pPr marL="285750" indent="-285750">
+              <a:buFont typeface="Arial" panose="020B0604020202020204" pitchFamily="34" charset="0"/>
+              <a:buChar char="•"/>
+            </a:pPr>
+            <a:endParaRPr lang="en-GB" dirty="0"/>
+          </a:p>
+        </p:txBody>
+      </p:sp>
+      <p:sp>
+        <p:nvSpPr>
+          <p:cNvPr id="58" name="Rettangolo con angoli arrotondati 57">
+            <a:extLst>
+              <a:ext uri="{FF2B5EF4-FFF2-40B4-BE49-F238E27FC236}">
+                <a16:creationId xmlns:a16="http://schemas.microsoft.com/office/drawing/2014/main" id="{07231B57-ABA6-8678-F265-D97ABF958FF8}"/>
+              </a:ext>
+            </a:extLst>
+          </p:cNvPr>
+          <p:cNvSpPr/>
+          <p:nvPr/>
+        </p:nvSpPr>
+        <p:spPr>
+          <a:xfrm>
+            <a:off x="4712634" y="3310601"/>
+            <a:ext cx="5428062" cy="2050832"/>
+          </a:xfrm>
+          <a:prstGeom prst="roundRect">
+            <a:avLst/>
+          </a:prstGeom>
+          <a:solidFill>
+            <a:schemeClr val="accent5">
+              <a:lumMod val="20000"/>
+              <a:lumOff val="80000"/>
+            </a:schemeClr>
+          </a:solidFill>
+          <a:ln w="19050" cap="flat" cmpd="sng" algn="ctr">
+            <a:solidFill>
+              <a:schemeClr val="accent5">
+                <a:lumMod val="60000"/>
+                <a:lumOff val="40000"/>
+              </a:schemeClr>
+            </a:solidFill>
+            <a:prstDash val="solid"/>
+            <a:round/>
+            <a:headEnd type="none" w="med" len="med"/>
+            <a:tailEnd type="none" w="med" len="med"/>
+          </a:ln>
+        </p:spPr>
+        <p:style>
+          <a:lnRef idx="0">
+            <a:scrgbClr r="0" g="0" b="0"/>
+          </a:lnRef>
+          <a:fillRef idx="0">
+            <a:scrgbClr r="0" g="0" b="0"/>
+          </a:fillRef>
+          <a:effectRef idx="0">
+            <a:scrgbClr r="0" g="0" b="0"/>
+          </a:effectRef>
+          <a:fontRef idx="minor">
+            <a:schemeClr val="dk1"/>
+          </a:fontRef>
+        </p:style>
+        <p:txBody>
+          <a:bodyPr rtlCol="0" anchor="ctr"/>
+          <a:lstStyle/>
+          <a:p>
+            <a:pPr algn="ctr"/>
+            <a:r>
+              <a:rPr lang="en-GB" b="1" dirty="0"/>
+              <a:t>Morphological features (Frequency domain)</a:t>
+            </a:r>
+          </a:p>
+          <a:p>
+            <a:pPr marL="285750" indent="-285750">
+              <a:buFont typeface="Arial" panose="020B0604020202020204" pitchFamily="34" charset="0"/>
+              <a:buChar char="•"/>
+            </a:pPr>
+            <a:r>
+              <a:rPr lang="en-GB" dirty="0"/>
+              <a:t>Mean, variance, energy of DWT coefficients on different levels of decomposition </a:t>
+            </a:r>
+            <a:r>
+              <a:rPr lang="en-GB" sz="1600" dirty="0">
+                <a:solidFill>
+                  <a:schemeClr val="bg2">
+                    <a:lumMod val="75000"/>
+                  </a:schemeClr>
+                </a:solidFill>
+              </a:rPr>
+              <a:t>[9]</a:t>
+            </a:r>
+            <a:endParaRPr lang="en-GB" dirty="0">
+              <a:solidFill>
+                <a:schemeClr val="bg2">
+                  <a:lumMod val="75000"/>
+                </a:schemeClr>
+              </a:solidFill>
+            </a:endParaRPr>
+          </a:p>
+          <a:p>
+            <a:pPr marL="285750" indent="-285750">
+              <a:buFont typeface="Arial" panose="020B0604020202020204" pitchFamily="34" charset="0"/>
+              <a:buChar char="•"/>
+            </a:pPr>
+            <a:r>
+              <a:rPr lang="en-GB" dirty="0"/>
+              <a:t>Relative power of PSD on fixed sub-bands </a:t>
+            </a:r>
+            <a:r>
+              <a:rPr lang="en-GB" sz="1600" dirty="0">
+                <a:solidFill>
+                  <a:schemeClr val="bg2">
+                    <a:lumMod val="75000"/>
+                  </a:schemeClr>
+                </a:solidFill>
+              </a:rPr>
+              <a:t>[10]</a:t>
+            </a:r>
+          </a:p>
+          <a:p>
+            <a:pPr marL="285750" indent="-285750">
+              <a:buFont typeface="Arial" panose="020B0604020202020204" pitchFamily="34" charset="0"/>
+              <a:buChar char="•"/>
+            </a:pPr>
+            <a:r>
+              <a:rPr lang="en-GB" dirty="0"/>
+              <a:t>PCA/ICA representations of frequency domain features </a:t>
+            </a:r>
+            <a:r>
+              <a:rPr lang="en-GB" sz="1600" dirty="0">
+                <a:solidFill>
+                  <a:schemeClr val="bg2">
+                    <a:lumMod val="75000"/>
+                  </a:schemeClr>
+                </a:solidFill>
+              </a:rPr>
+              <a:t>[9]</a:t>
+            </a:r>
+            <a:endParaRPr lang="en-GB" dirty="0">
+              <a:solidFill>
+                <a:schemeClr val="bg2">
+                  <a:lumMod val="75000"/>
+                </a:schemeClr>
+              </a:solidFill>
+            </a:endParaRPr>
+          </a:p>
+        </p:txBody>
+      </p:sp>
+      <p:sp>
+        <p:nvSpPr>
+          <p:cNvPr id="59" name="Rettangolo con angoli arrotondati 58">
+            <a:extLst>
+              <a:ext uri="{FF2B5EF4-FFF2-40B4-BE49-F238E27FC236}">
+                <a16:creationId xmlns:a16="http://schemas.microsoft.com/office/drawing/2014/main" id="{0C43E1DD-83A0-27BD-0886-0290EB076CE9}"/>
+              </a:ext>
+            </a:extLst>
+          </p:cNvPr>
+          <p:cNvSpPr/>
+          <p:nvPr/>
+        </p:nvSpPr>
+        <p:spPr>
+          <a:xfrm>
+            <a:off x="4712634" y="5576147"/>
+            <a:ext cx="5428062" cy="579672"/>
+          </a:xfrm>
+          <a:prstGeom prst="roundRect">
+            <a:avLst>
+              <a:gd name="adj" fmla="val 26495"/>
+            </a:avLst>
+          </a:prstGeom>
+          <a:solidFill>
+            <a:schemeClr val="accent6">
+              <a:lumMod val="20000"/>
+              <a:lumOff val="80000"/>
+            </a:schemeClr>
+          </a:solidFill>
+          <a:ln w="19050" cap="flat" cmpd="sng" algn="ctr">
+            <a:solidFill>
+              <a:schemeClr val="accent6">
+                <a:lumMod val="60000"/>
+                <a:lumOff val="40000"/>
+              </a:schemeClr>
+            </a:solidFill>
+            <a:prstDash val="solid"/>
+            <a:round/>
+            <a:headEnd type="none" w="med" len="med"/>
+            <a:tailEnd type="none" w="med" len="med"/>
+          </a:ln>
+        </p:spPr>
+        <p:style>
+          <a:lnRef idx="0">
+            <a:scrgbClr r="0" g="0" b="0"/>
+          </a:lnRef>
+          <a:fillRef idx="0">
+            <a:scrgbClr r="0" g="0" b="0"/>
+          </a:fillRef>
+          <a:effectRef idx="0">
+            <a:scrgbClr r="0" g="0" b="0"/>
+          </a:effectRef>
+          <a:fontRef idx="minor">
+            <a:schemeClr val="dk1"/>
+          </a:fontRef>
+        </p:style>
+        <p:txBody>
+          <a:bodyPr rtlCol="0" anchor="ctr"/>
+          <a:lstStyle/>
+          <a:p>
+            <a:pPr algn="ctr"/>
+            <a:r>
+              <a:rPr lang="en-GB" b="1" dirty="0"/>
+              <a:t>Label</a:t>
+            </a:r>
+            <a:r>
+              <a:rPr lang="en-GB" dirty="0"/>
+              <a:t> </a:t>
+            </a:r>
+          </a:p>
+          <a:p>
+            <a:pPr algn="ctr"/>
+            <a:r>
+              <a:rPr lang="en-GB" dirty="0"/>
+              <a:t>Map A, Map B, Map C</a:t>
+            </a:r>
+          </a:p>
+        </p:txBody>
+      </p:sp>
+      <p:sp>
+        <p:nvSpPr>
+          <p:cNvPr id="60" name="Triangolo isoscele 59">
+            <a:extLst>
+              <a:ext uri="{FF2B5EF4-FFF2-40B4-BE49-F238E27FC236}">
+                <a16:creationId xmlns:a16="http://schemas.microsoft.com/office/drawing/2014/main" id="{347F0008-E703-E810-C9F5-28F22A9CA3BD}"/>
+              </a:ext>
+            </a:extLst>
+          </p:cNvPr>
+          <p:cNvSpPr/>
+          <p:nvPr/>
+        </p:nvSpPr>
+        <p:spPr>
+          <a:xfrm rot="16200000">
+            <a:off x="1320350" y="2779959"/>
+            <a:ext cx="4423154" cy="2050435"/>
+          </a:xfrm>
+          <a:prstGeom prst="triangle">
+            <a:avLst>
+              <a:gd name="adj" fmla="val 38075"/>
+            </a:avLst>
+          </a:prstGeom>
+          <a:gradFill>
+            <a:gsLst>
+              <a:gs pos="62000">
+                <a:srgbClr val="EFF5FB"/>
+              </a:gs>
+              <a:gs pos="27000">
+                <a:schemeClr val="accent5">
+                  <a:lumMod val="20000"/>
+                  <a:lumOff val="80000"/>
+                </a:schemeClr>
+              </a:gs>
+              <a:gs pos="90000">
+                <a:schemeClr val="bg1"/>
+              </a:gs>
+            </a:gsLst>
+            <a:lin ang="5400000" scaled="1"/>
+          </a:gradFill>
+          <a:ln w="3175">
+            <a:noFill/>
+          </a:ln>
+        </p:spPr>
+        <p:style>
+          <a:lnRef idx="2">
+            <a:schemeClr val="accent1">
+              <a:shade val="15000"/>
+            </a:schemeClr>
+          </a:lnRef>
+          <a:fillRef idx="1">
+            <a:schemeClr val="accent1"/>
+          </a:fillRef>
+          <a:effectRef idx="0">
+            <a:schemeClr val="accent1"/>
+          </a:effectRef>
+          <a:fontRef idx="minor">
+            <a:schemeClr val="lt1"/>
+          </a:fontRef>
+        </p:style>
+        <p:txBody>
+          <a:bodyPr rtlCol="0" anchor="ctr"/>
+          <a:lstStyle/>
+          <a:p>
+            <a:pPr algn="ctr"/>
+            <a:endParaRPr lang="it-IT"/>
+          </a:p>
+        </p:txBody>
+      </p:sp>
+      <p:sp>
+        <p:nvSpPr>
+          <p:cNvPr id="62" name="CasellaDiTesto 61">
+            <a:extLst>
+              <a:ext uri="{FF2B5EF4-FFF2-40B4-BE49-F238E27FC236}">
+                <a16:creationId xmlns:a16="http://schemas.microsoft.com/office/drawing/2014/main" id="{248C0A6A-F1D2-3846-4644-4BEF7E7E77DD}"/>
+              </a:ext>
+            </a:extLst>
+          </p:cNvPr>
+          <p:cNvSpPr txBox="1"/>
+          <p:nvPr/>
+        </p:nvSpPr>
+        <p:spPr>
+          <a:xfrm>
+            <a:off x="424958" y="6368689"/>
+            <a:ext cx="10730722" cy="369332"/>
+          </a:xfrm>
+          <a:prstGeom prst="rect">
+            <a:avLst/>
+          </a:prstGeom>
+          <a:noFill/>
+        </p:spPr>
+        <p:txBody>
+          <a:bodyPr wrap="square">
+            <a:spAutoFit/>
+          </a:bodyPr>
+          <a:lstStyle/>
+          <a:p>
+            <a:pPr>
+              <a:spcBef>
+                <a:spcPts val="0"/>
+              </a:spcBef>
+              <a:spcAft>
+                <a:spcPts val="0"/>
+              </a:spcAft>
+            </a:pPr>
+            <a:r>
+              <a:rPr lang="it-IT" sz="900" dirty="0">
+                <a:effectLst/>
+              </a:rPr>
+              <a:t>9. E. J. D. S. Luz, W. R. Schwartz, G. </a:t>
+            </a:r>
+            <a:r>
+              <a:rPr lang="it-IT" sz="900" dirty="0" err="1">
+                <a:effectLst/>
+              </a:rPr>
+              <a:t>Cámara</a:t>
+            </a:r>
+            <a:r>
+              <a:rPr lang="it-IT" sz="900" dirty="0">
+                <a:effectLst/>
+              </a:rPr>
+              <a:t>-Chávez, e D. Menotti, «ECG-</a:t>
+            </a:r>
+            <a:r>
+              <a:rPr lang="it-IT" sz="900" dirty="0" err="1">
+                <a:effectLst/>
+              </a:rPr>
+              <a:t>based</a:t>
+            </a:r>
+            <a:r>
+              <a:rPr lang="it-IT" sz="900" dirty="0">
+                <a:effectLst/>
+              </a:rPr>
+              <a:t> </a:t>
+            </a:r>
+            <a:r>
+              <a:rPr lang="it-IT" sz="900" dirty="0" err="1">
+                <a:effectLst/>
+              </a:rPr>
+              <a:t>heartbeat</a:t>
+            </a:r>
+            <a:r>
+              <a:rPr lang="it-IT" sz="900" dirty="0">
+                <a:effectLst/>
+              </a:rPr>
+              <a:t> </a:t>
+            </a:r>
+            <a:r>
+              <a:rPr lang="it-IT" sz="900" dirty="0" err="1">
+                <a:effectLst/>
+              </a:rPr>
+              <a:t>classification</a:t>
+            </a:r>
+            <a:r>
+              <a:rPr lang="it-IT" sz="900" dirty="0">
+                <a:effectLst/>
+              </a:rPr>
+              <a:t> for </a:t>
+            </a:r>
+            <a:r>
+              <a:rPr lang="it-IT" sz="900" dirty="0" err="1">
+                <a:effectLst/>
+              </a:rPr>
+              <a:t>arrhythmia</a:t>
+            </a:r>
+            <a:r>
+              <a:rPr lang="it-IT" sz="900" dirty="0">
+                <a:effectLst/>
+              </a:rPr>
+              <a:t> detection: A survey», </a:t>
+            </a:r>
+            <a:r>
+              <a:rPr lang="it-IT" sz="900" i="1" dirty="0">
+                <a:effectLst/>
+              </a:rPr>
+              <a:t>Computer Methods and Programs in Biomedicine</a:t>
+            </a:r>
+            <a:r>
+              <a:rPr lang="it-IT" sz="900" dirty="0">
+                <a:effectLst/>
+              </a:rPr>
+              <a:t>, vol. 127, pp. 144–164, apr. 2016.</a:t>
+            </a:r>
+          </a:p>
+          <a:p>
+            <a:pPr>
+              <a:spcBef>
+                <a:spcPts val="0"/>
+              </a:spcBef>
+              <a:spcAft>
+                <a:spcPts val="0"/>
+              </a:spcAft>
+            </a:pPr>
+            <a:r>
+              <a:rPr lang="it-IT" sz="900" dirty="0">
+                <a:effectLst/>
+              </a:rPr>
+              <a:t>10. G. Baldazzi, M. Orrù, G. Viola, e D. Pani, «Computer-</a:t>
+            </a:r>
+            <a:r>
+              <a:rPr lang="it-IT" sz="900" dirty="0" err="1">
+                <a:effectLst/>
+              </a:rPr>
+              <a:t>aided</a:t>
+            </a:r>
+            <a:r>
+              <a:rPr lang="it-IT" sz="900" dirty="0">
+                <a:effectLst/>
+              </a:rPr>
+              <a:t> detection of </a:t>
+            </a:r>
+            <a:r>
+              <a:rPr lang="it-IT" sz="900" dirty="0" err="1">
+                <a:effectLst/>
+              </a:rPr>
+              <a:t>arrhythmogenic</a:t>
+            </a:r>
+            <a:r>
+              <a:rPr lang="it-IT" sz="900" dirty="0">
+                <a:effectLst/>
+              </a:rPr>
+              <a:t> </a:t>
+            </a:r>
+            <a:r>
+              <a:rPr lang="it-IT" sz="900" dirty="0" err="1">
+                <a:effectLst/>
+              </a:rPr>
+              <a:t>sites</a:t>
+            </a:r>
+            <a:r>
+              <a:rPr lang="it-IT" sz="900" dirty="0">
+                <a:effectLst/>
+              </a:rPr>
+              <a:t> in post-</a:t>
+            </a:r>
+            <a:r>
+              <a:rPr lang="it-IT" sz="900" dirty="0" err="1">
+                <a:effectLst/>
+              </a:rPr>
+              <a:t>ischemic</a:t>
+            </a:r>
+            <a:r>
+              <a:rPr lang="it-IT" sz="900" dirty="0">
+                <a:effectLst/>
+              </a:rPr>
+              <a:t> </a:t>
+            </a:r>
+            <a:r>
+              <a:rPr lang="it-IT" sz="900" dirty="0" err="1">
+                <a:effectLst/>
+              </a:rPr>
+              <a:t>ventricular</a:t>
+            </a:r>
+            <a:r>
+              <a:rPr lang="it-IT" sz="900" dirty="0">
+                <a:effectLst/>
+              </a:rPr>
+              <a:t> </a:t>
+            </a:r>
+            <a:r>
+              <a:rPr lang="it-IT" sz="900" dirty="0" err="1">
+                <a:effectLst/>
+              </a:rPr>
+              <a:t>tachycardia</a:t>
+            </a:r>
+            <a:r>
+              <a:rPr lang="it-IT" sz="900" dirty="0">
+                <a:effectLst/>
+              </a:rPr>
+              <a:t>», </a:t>
+            </a:r>
+            <a:r>
+              <a:rPr lang="it-IT" sz="900" i="1" dirty="0">
+                <a:effectLst/>
+              </a:rPr>
+              <a:t>Sci Rep</a:t>
+            </a:r>
+            <a:r>
+              <a:rPr lang="it-IT" sz="900" dirty="0">
+                <a:effectLst/>
+              </a:rPr>
+              <a:t>, vol. 13, fasc. 1, p. 6906, apr. 2023</a:t>
+            </a:r>
+          </a:p>
+        </p:txBody>
+      </p:sp>
+    </p:spTree>
+    <p:extLst>
+      <p:ext uri="{BB962C8B-B14F-4D97-AF65-F5344CB8AC3E}">
+        <p14:creationId xmlns:p14="http://schemas.microsoft.com/office/powerpoint/2010/main" val="2018706069"/>
+      </p:ext>
+    </p:extLst>
+  </p:cSld>
+  <p:clrMapOvr>
+    <a:masterClrMapping/>
+  </p:clrMapOvr>
+</p:sld>
+</file>
+
+<file path=ppt/slides/slide18.xml><?xml version="1.0" encoding="utf-8"?>
+<p:sld xmlns:a="http://schemas.openxmlformats.org/drawingml/2006/main" xmlns:r="http://schemas.openxmlformats.org/officeDocument/2006/relationships" xmlns:p="http://schemas.openxmlformats.org/presentationml/2006/main">
+  <p:cSld>
+    <p:spTree>
+      <p:nvGrpSpPr>
+        <p:cNvPr id="1" name=""/>
+        <p:cNvGrpSpPr/>
+        <p:nvPr/>
+      </p:nvGrpSpPr>
+      <p:grpSpPr>
+        <a:xfrm>
+          <a:off x="0" y="0"/>
+          <a:ext cx="0" cy="0"/>
+          <a:chOff x="0" y="0"/>
+          <a:chExt cx="0" cy="0"/>
+        </a:xfrm>
+      </p:grpSpPr>
+      <p:sp>
+        <p:nvSpPr>
+          <p:cNvPr id="2" name="Titolo 1">
+            <a:extLst>
+              <a:ext uri="{FF2B5EF4-FFF2-40B4-BE49-F238E27FC236}">
+                <a16:creationId xmlns:a16="http://schemas.microsoft.com/office/drawing/2014/main" id="{90F52EA4-9809-985C-8A8C-85AEDD39AF3B}"/>
+              </a:ext>
+            </a:extLst>
+          </p:cNvPr>
+          <p:cNvSpPr>
+            <a:spLocks noGrp="1"/>
+          </p:cNvSpPr>
+          <p:nvPr>
+            <p:ph type="title"/>
+          </p:nvPr>
+        </p:nvSpPr>
+        <p:spPr/>
+        <p:txBody>
+          <a:bodyPr/>
+          <a:lstStyle/>
+          <a:p>
+            <a:r>
+              <a:rPr lang="en-US" dirty="0"/>
+              <a:t>Outline </a:t>
+            </a:r>
+          </a:p>
+        </p:txBody>
+      </p:sp>
+      <p:sp>
+        <p:nvSpPr>
+          <p:cNvPr id="3" name="Segnaposto contenuto 2">
+            <a:extLst>
+              <a:ext uri="{FF2B5EF4-FFF2-40B4-BE49-F238E27FC236}">
+                <a16:creationId xmlns:a16="http://schemas.microsoft.com/office/drawing/2014/main" id="{B080D17D-5CB5-7A4C-86CF-032C6E6BEB1F}"/>
+              </a:ext>
+            </a:extLst>
+          </p:cNvPr>
+          <p:cNvSpPr>
+            <a:spLocks noGrp="1"/>
+          </p:cNvSpPr>
+          <p:nvPr>
+            <p:ph idx="1"/>
+          </p:nvPr>
+        </p:nvSpPr>
+        <p:spPr>
+          <a:xfrm>
+            <a:off x="664464" y="2041497"/>
+            <a:ext cx="10098024" cy="2613436"/>
+          </a:xfrm>
+        </p:spPr>
+        <p:txBody>
+          <a:bodyPr>
+            <a:noAutofit/>
+          </a:bodyPr>
+          <a:lstStyle/>
+          <a:p>
+            <a:r>
+              <a:rPr lang="en-US" sz="2000" dirty="0">
+                <a:solidFill>
+                  <a:schemeClr val="bg2">
+                    <a:lumMod val="75000"/>
+                  </a:schemeClr>
+                </a:solidFill>
+              </a:rPr>
+              <a:t>Recap of objectives so far</a:t>
+            </a:r>
+          </a:p>
+          <a:p>
+            <a:r>
+              <a:rPr lang="en-US" sz="2000" dirty="0">
+                <a:solidFill>
+                  <a:schemeClr val="bg2">
+                    <a:lumMod val="75000"/>
+                  </a:schemeClr>
+                </a:solidFill>
+              </a:rPr>
+              <a:t>Signal preprocessing </a:t>
+            </a:r>
+          </a:p>
+          <a:p>
+            <a:r>
+              <a:rPr lang="en-US" sz="2000" dirty="0">
+                <a:solidFill>
+                  <a:schemeClr val="bg2">
+                    <a:lumMod val="75000"/>
+                  </a:schemeClr>
+                </a:solidFill>
+              </a:rPr>
+              <a:t>Spectrum estimation</a:t>
+            </a:r>
+          </a:p>
+          <a:p>
+            <a:r>
+              <a:rPr lang="en-US" sz="2000" dirty="0">
+                <a:solidFill>
+                  <a:schemeClr val="bg2">
+                    <a:lumMod val="75000"/>
+                  </a:schemeClr>
+                </a:solidFill>
+              </a:rPr>
+              <a:t>Signals alignment </a:t>
+            </a:r>
+          </a:p>
+          <a:p>
+            <a:r>
+              <a:rPr lang="en-US" sz="2000" dirty="0">
+                <a:solidFill>
+                  <a:schemeClr val="bg2">
+                    <a:lumMod val="75000"/>
+                  </a:schemeClr>
+                </a:solidFill>
+              </a:rPr>
+              <a:t>Possible features of Rov Signals</a:t>
+            </a:r>
+          </a:p>
+          <a:p>
+            <a:r>
+              <a:rPr lang="en-US" sz="2000" dirty="0"/>
+              <a:t>Conclusions</a:t>
+            </a:r>
+            <a:endParaRPr lang="en-US" sz="1600" dirty="0"/>
+          </a:p>
+          <a:p>
+            <a:pPr marL="0" indent="0">
+              <a:buNone/>
+            </a:pPr>
+            <a:endParaRPr lang="en-US" sz="1600" dirty="0">
+              <a:solidFill>
+                <a:schemeClr val="bg2">
+                  <a:lumMod val="75000"/>
+                </a:schemeClr>
+              </a:solidFill>
+            </a:endParaRPr>
+          </a:p>
+        </p:txBody>
+      </p:sp>
+      <p:sp>
+        <p:nvSpPr>
+          <p:cNvPr id="4" name="Segnaposto numero diapositiva 3">
+            <a:extLst>
+              <a:ext uri="{FF2B5EF4-FFF2-40B4-BE49-F238E27FC236}">
+                <a16:creationId xmlns:a16="http://schemas.microsoft.com/office/drawing/2014/main" id="{8B351BE6-1815-C162-224E-864AC8EF79D2}"/>
+              </a:ext>
+            </a:extLst>
+          </p:cNvPr>
+          <p:cNvSpPr>
+            <a:spLocks noGrp="1"/>
+          </p:cNvSpPr>
+          <p:nvPr>
+            <p:ph type="sldNum" sz="quarter" idx="12"/>
+          </p:nvPr>
+        </p:nvSpPr>
+        <p:spPr/>
+        <p:txBody>
+          <a:bodyPr/>
+          <a:lstStyle/>
+          <a:p>
+            <a:fld id="{2FA0223F-D95A-431D-9A71-EDA7FA0C2F5B}" type="slidenum">
+              <a:rPr lang="en-US" smtClean="0"/>
+              <a:t>18</a:t>
+            </a:fld>
+            <a:endParaRPr lang="en-US" dirty="0"/>
+          </a:p>
+        </p:txBody>
+      </p:sp>
+    </p:spTree>
+    <p:extLst>
+      <p:ext uri="{BB962C8B-B14F-4D97-AF65-F5344CB8AC3E}">
         <p14:creationId xmlns:p14="http://schemas.microsoft.com/office/powerpoint/2010/main" val="3156717787"/>
       </p:ext>
     </p:extLst>
@@ -17237,7 +19197,7 @@
 </p:sld>
 </file>
 
-<file path=ppt/slides/slide17.xml><?xml version="1.0" encoding="utf-8"?>
+<file path=ppt/slides/slide19.xml><?xml version="1.0" encoding="utf-8"?>
 <p:sld xmlns:a="http://schemas.openxmlformats.org/drawingml/2006/main" xmlns:r="http://schemas.openxmlformats.org/officeDocument/2006/relationships" xmlns:p="http://schemas.openxmlformats.org/presentationml/2006/main">
   <p:cSld>
     <p:spTree>
@@ -17313,7 +19273,7 @@
           <a:p>
             <a:fld id="{2FA0223F-D95A-431D-9A71-EDA7FA0C2F5B}" type="slidenum">
               <a:rPr lang="en-US" smtClean="0"/>
-              <a:t>17</a:t>
+              <a:t>19</a:t>
             </a:fld>
             <a:endParaRPr lang="en-US"/>
           </a:p>
@@ -18472,6 +20432,12 @@
           <a:p>
             <a:r>
               <a:rPr lang="en-US" sz="2000" dirty="0"/>
+              <a:t>Possible features of Rov Signals</a:t>
+            </a:r>
+          </a:p>
+          <a:p>
+            <a:r>
+              <a:rPr lang="en-US" sz="2000" dirty="0"/>
               <a:t>Conclusions</a:t>
             </a:r>
             <a:endParaRPr lang="en-US" sz="1600" dirty="0"/>
@@ -18517,6 +20483,1788 @@
     <p:extLst>
       <p:ext uri="{BB962C8B-B14F-4D97-AF65-F5344CB8AC3E}">
         <p14:creationId xmlns:p14="http://schemas.microsoft.com/office/powerpoint/2010/main" val="1561499463"/>
+      </p:ext>
+    </p:extLst>
+  </p:cSld>
+  <p:clrMapOvr>
+    <a:masterClrMapping/>
+  </p:clrMapOvr>
+</p:sld>
+</file>
+
+<file path=ppt/slides/slide20.xml><?xml version="1.0" encoding="utf-8"?>
+<p:sld xmlns:a="http://schemas.openxmlformats.org/drawingml/2006/main" xmlns:r="http://schemas.openxmlformats.org/officeDocument/2006/relationships" xmlns:p="http://schemas.openxmlformats.org/presentationml/2006/main">
+  <p:cSld>
+    <p:spTree>
+      <p:nvGrpSpPr>
+        <p:cNvPr id="1" name=""/>
+        <p:cNvGrpSpPr/>
+        <p:nvPr/>
+      </p:nvGrpSpPr>
+      <p:grpSpPr>
+        <a:xfrm>
+          <a:off x="0" y="0"/>
+          <a:ext cx="0" cy="0"/>
+          <a:chOff x="0" y="0"/>
+          <a:chExt cx="0" cy="0"/>
+        </a:xfrm>
+      </p:grpSpPr>
+      <p:sp>
+        <p:nvSpPr>
+          <p:cNvPr id="2" name="Titolo 1">
+            <a:extLst>
+              <a:ext uri="{FF2B5EF4-FFF2-40B4-BE49-F238E27FC236}">
+                <a16:creationId xmlns:a16="http://schemas.microsoft.com/office/drawing/2014/main" id="{90F52EA4-9809-985C-8A8C-85AEDD39AF3B}"/>
+              </a:ext>
+            </a:extLst>
+          </p:cNvPr>
+          <p:cNvSpPr>
+            <a:spLocks noGrp="1"/>
+          </p:cNvSpPr>
+          <p:nvPr>
+            <p:ph type="title"/>
+          </p:nvPr>
+        </p:nvSpPr>
+        <p:spPr/>
+        <p:txBody>
+          <a:bodyPr/>
+          <a:lstStyle/>
+          <a:p>
+            <a:r>
+              <a:rPr lang="en-US" dirty="0"/>
+              <a:t>Traces alignment pipeline</a:t>
+            </a:r>
+          </a:p>
+        </p:txBody>
+      </p:sp>
+      <p:sp>
+        <p:nvSpPr>
+          <p:cNvPr id="4" name="Segnaposto numero diapositiva 3">
+            <a:extLst>
+              <a:ext uri="{FF2B5EF4-FFF2-40B4-BE49-F238E27FC236}">
+                <a16:creationId xmlns:a16="http://schemas.microsoft.com/office/drawing/2014/main" id="{8B351BE6-1815-C162-224E-864AC8EF79D2}"/>
+              </a:ext>
+            </a:extLst>
+          </p:cNvPr>
+          <p:cNvSpPr>
+            <a:spLocks noGrp="1"/>
+          </p:cNvSpPr>
+          <p:nvPr>
+            <p:ph type="sldNum" sz="quarter" idx="12"/>
+          </p:nvPr>
+        </p:nvSpPr>
+        <p:spPr/>
+        <p:txBody>
+          <a:bodyPr/>
+          <a:lstStyle/>
+          <a:p>
+            <a:fld id="{2FA0223F-D95A-431D-9A71-EDA7FA0C2F5B}" type="slidenum">
+              <a:rPr lang="en-US" smtClean="0"/>
+              <a:t>20</a:t>
+            </a:fld>
+            <a:endParaRPr lang="en-US"/>
+          </a:p>
+        </p:txBody>
+      </p:sp>
+      <mc:AlternateContent xmlns:mc="http://schemas.openxmlformats.org/markup-compatibility/2006" xmlns:a14="http://schemas.microsoft.com/office/drawing/2010/main">
+        <mc:Choice Requires="a14">
+          <p:sp>
+            <p:nvSpPr>
+              <p:cNvPr id="6" name="Segnaposto contenuto 2">
+                <a:extLst>
+                  <a:ext uri="{FF2B5EF4-FFF2-40B4-BE49-F238E27FC236}">
+                    <a16:creationId xmlns:a16="http://schemas.microsoft.com/office/drawing/2014/main" id="{D9704C79-DF15-E314-C934-557E33389704}"/>
+                  </a:ext>
+                </a:extLst>
+              </p:cNvPr>
+              <p:cNvSpPr txBox="1">
+                <a:spLocks/>
+              </p:cNvSpPr>
+              <p:nvPr/>
+            </p:nvSpPr>
+            <p:spPr>
+              <a:xfrm>
+                <a:off x="360390" y="1525166"/>
+                <a:ext cx="5455194" cy="3924658"/>
+              </a:xfrm>
+              <a:prstGeom prst="rect">
+                <a:avLst/>
+              </a:prstGeom>
+            </p:spPr>
+            <p:txBody>
+              <a:bodyPr vert="horz" lIns="91440" tIns="45720" rIns="91440" bIns="45720" rtlCol="0">
+                <a:noAutofit/>
+              </a:bodyPr>
+              <a:lstStyle>
+                <a:lvl1pPr marL="228600" indent="-228600" algn="l" defTabSz="914400" rtl="0" eaLnBrk="1" latinLnBrk="0" hangingPunct="1">
+                  <a:lnSpc>
+                    <a:spcPct val="90000"/>
+                  </a:lnSpc>
+                  <a:spcBef>
+                    <a:spcPts val="1000"/>
+                  </a:spcBef>
+                  <a:buFont typeface="Arial" panose="020B0604020202020204" pitchFamily="34" charset="0"/>
+                  <a:buChar char="•"/>
+                  <a:defRPr sz="2800" kern="1200">
+                    <a:solidFill>
+                      <a:schemeClr val="tx1"/>
+                    </a:solidFill>
+                    <a:latin typeface="+mn-lt"/>
+                    <a:ea typeface="+mn-ea"/>
+                    <a:cs typeface="+mn-cs"/>
+                  </a:defRPr>
+                </a:lvl1pPr>
+                <a:lvl2pPr marL="685800" indent="-228600" algn="l" defTabSz="914400" rtl="0" eaLnBrk="1" latinLnBrk="0" hangingPunct="1">
+                  <a:lnSpc>
+                    <a:spcPct val="90000"/>
+                  </a:lnSpc>
+                  <a:spcBef>
+                    <a:spcPts val="500"/>
+                  </a:spcBef>
+                  <a:buFont typeface="Arial" panose="020B0604020202020204" pitchFamily="34" charset="0"/>
+                  <a:buChar char="•"/>
+                  <a:defRPr sz="2400" kern="1200">
+                    <a:solidFill>
+                      <a:schemeClr val="tx1"/>
+                    </a:solidFill>
+                    <a:latin typeface="+mn-lt"/>
+                    <a:ea typeface="+mn-ea"/>
+                    <a:cs typeface="+mn-cs"/>
+                  </a:defRPr>
+                </a:lvl2pPr>
+                <a:lvl3pPr marL="1143000" indent="-228600" algn="l" defTabSz="914400" rtl="0" eaLnBrk="1" latinLnBrk="0" hangingPunct="1">
+                  <a:lnSpc>
+                    <a:spcPct val="90000"/>
+                  </a:lnSpc>
+                  <a:spcBef>
+                    <a:spcPts val="500"/>
+                  </a:spcBef>
+                  <a:buFont typeface="Arial" panose="020B0604020202020204" pitchFamily="34" charset="0"/>
+                  <a:buChar char="•"/>
+                  <a:defRPr sz="2000" kern="1200">
+                    <a:solidFill>
+                      <a:schemeClr val="tx1"/>
+                    </a:solidFill>
+                    <a:latin typeface="+mn-lt"/>
+                    <a:ea typeface="+mn-ea"/>
+                    <a:cs typeface="+mn-cs"/>
+                  </a:defRPr>
+                </a:lvl3pPr>
+                <a:lvl4pPr marL="1600200" indent="-228600" algn="l" defTabSz="914400" rtl="0" eaLnBrk="1" latinLnBrk="0" hangingPunct="1">
+                  <a:lnSpc>
+                    <a:spcPct val="90000"/>
+                  </a:lnSpc>
+                  <a:spcBef>
+                    <a:spcPts val="500"/>
+                  </a:spcBef>
+                  <a:buFont typeface="Arial" panose="020B0604020202020204" pitchFamily="34" charset="0"/>
+                  <a:buChar char="•"/>
+                  <a:defRPr sz="1800" kern="1200">
+                    <a:solidFill>
+                      <a:schemeClr val="tx1"/>
+                    </a:solidFill>
+                    <a:latin typeface="+mn-lt"/>
+                    <a:ea typeface="+mn-ea"/>
+                    <a:cs typeface="+mn-cs"/>
+                  </a:defRPr>
+                </a:lvl4pPr>
+                <a:lvl5pPr marL="2057400" indent="-228600" algn="l" defTabSz="914400" rtl="0" eaLnBrk="1" latinLnBrk="0" hangingPunct="1">
+                  <a:lnSpc>
+                    <a:spcPct val="90000"/>
+                  </a:lnSpc>
+                  <a:spcBef>
+                    <a:spcPts val="500"/>
+                  </a:spcBef>
+                  <a:buFont typeface="Arial" panose="020B0604020202020204" pitchFamily="34" charset="0"/>
+                  <a:buChar char="•"/>
+                  <a:defRPr sz="1800" kern="1200">
+                    <a:solidFill>
+                      <a:schemeClr val="tx1"/>
+                    </a:solidFill>
+                    <a:latin typeface="+mn-lt"/>
+                    <a:ea typeface="+mn-ea"/>
+                    <a:cs typeface="+mn-cs"/>
+                  </a:defRPr>
+                </a:lvl5pPr>
+                <a:lvl6pPr marL="2514600" indent="-228600" algn="l" defTabSz="914400" rtl="0" eaLnBrk="1" latinLnBrk="0" hangingPunct="1">
+                  <a:lnSpc>
+                    <a:spcPct val="90000"/>
+                  </a:lnSpc>
+                  <a:spcBef>
+                    <a:spcPts val="500"/>
+                  </a:spcBef>
+                  <a:buFont typeface="Arial" panose="020B0604020202020204" pitchFamily="34" charset="0"/>
+                  <a:buChar char="•"/>
+                  <a:defRPr sz="1800" kern="1200">
+                    <a:solidFill>
+                      <a:schemeClr val="tx1"/>
+                    </a:solidFill>
+                    <a:latin typeface="+mn-lt"/>
+                    <a:ea typeface="+mn-ea"/>
+                    <a:cs typeface="+mn-cs"/>
+                  </a:defRPr>
+                </a:lvl6pPr>
+                <a:lvl7pPr marL="2971800" indent="-228600" algn="l" defTabSz="914400" rtl="0" eaLnBrk="1" latinLnBrk="0" hangingPunct="1">
+                  <a:lnSpc>
+                    <a:spcPct val="90000"/>
+                  </a:lnSpc>
+                  <a:spcBef>
+                    <a:spcPts val="500"/>
+                  </a:spcBef>
+                  <a:buFont typeface="Arial" panose="020B0604020202020204" pitchFamily="34" charset="0"/>
+                  <a:buChar char="•"/>
+                  <a:defRPr sz="1800" kern="1200">
+                    <a:solidFill>
+                      <a:schemeClr val="tx1"/>
+                    </a:solidFill>
+                    <a:latin typeface="+mn-lt"/>
+                    <a:ea typeface="+mn-ea"/>
+                    <a:cs typeface="+mn-cs"/>
+                  </a:defRPr>
+                </a:lvl7pPr>
+                <a:lvl8pPr marL="3429000" indent="-228600" algn="l" defTabSz="914400" rtl="0" eaLnBrk="1" latinLnBrk="0" hangingPunct="1">
+                  <a:lnSpc>
+                    <a:spcPct val="90000"/>
+                  </a:lnSpc>
+                  <a:spcBef>
+                    <a:spcPts val="500"/>
+                  </a:spcBef>
+                  <a:buFont typeface="Arial" panose="020B0604020202020204" pitchFamily="34" charset="0"/>
+                  <a:buChar char="•"/>
+                  <a:defRPr sz="1800" kern="1200">
+                    <a:solidFill>
+                      <a:schemeClr val="tx1"/>
+                    </a:solidFill>
+                    <a:latin typeface="+mn-lt"/>
+                    <a:ea typeface="+mn-ea"/>
+                    <a:cs typeface="+mn-cs"/>
+                  </a:defRPr>
+                </a:lvl8pPr>
+                <a:lvl9pPr marL="3886200" indent="-228600" algn="l" defTabSz="914400" rtl="0" eaLnBrk="1" latinLnBrk="0" hangingPunct="1">
+                  <a:lnSpc>
+                    <a:spcPct val="90000"/>
+                  </a:lnSpc>
+                  <a:spcBef>
+                    <a:spcPts val="500"/>
+                  </a:spcBef>
+                  <a:buFont typeface="Arial" panose="020B0604020202020204" pitchFamily="34" charset="0"/>
+                  <a:buChar char="•"/>
+                  <a:defRPr sz="1800" kern="1200">
+                    <a:solidFill>
+                      <a:schemeClr val="tx1"/>
+                    </a:solidFill>
+                    <a:latin typeface="+mn-lt"/>
+                    <a:ea typeface="+mn-ea"/>
+                    <a:cs typeface="+mn-cs"/>
+                  </a:defRPr>
+                </a:lvl9pPr>
+              </a:lstStyle>
+              <a:p>
+                <a:pPr marL="0" indent="0" algn="ctr">
+                  <a:buNone/>
+                </a:pPr>
+                <a:r>
+                  <a:rPr lang="en-GB" sz="1800" b="1" dirty="0">
+                    <a:latin typeface="+mj-lt"/>
+                  </a:rPr>
+                  <a:t>In-subject alignment</a:t>
+                </a:r>
+              </a:p>
+              <a:p>
+                <a:pPr marL="0" indent="0">
+                  <a:buNone/>
+                </a:pPr>
+                <a:r>
+                  <a:rPr lang="en-GB" sz="1400" dirty="0">
+                    <a:latin typeface="+mj-lt"/>
+                  </a:rPr>
+                  <a:t>For each signal:</a:t>
+                </a:r>
+              </a:p>
+              <a:p>
+                <a:r>
+                  <a:rPr lang="en-GB" sz="1400" dirty="0">
+                    <a:latin typeface="+mj-lt"/>
+                  </a:rPr>
+                  <a:t>On the </a:t>
+                </a:r>
+                <a:r>
+                  <a:rPr lang="en-GB" sz="1400" b="1" dirty="0">
+                    <a:solidFill>
+                      <a:srgbClr val="C00000"/>
+                    </a:solidFill>
+                    <a:latin typeface="+mj-lt"/>
+                  </a:rPr>
+                  <a:t>reference</a:t>
+                </a:r>
+                <a:r>
+                  <a:rPr lang="en-GB" sz="1400" dirty="0">
+                    <a:latin typeface="+mj-lt"/>
+                  </a:rPr>
+                  <a:t> </a:t>
+                </a:r>
+                <a:r>
+                  <a:rPr lang="en-GB" sz="1400" b="1" dirty="0">
+                    <a:solidFill>
+                      <a:srgbClr val="C00000"/>
+                    </a:solidFill>
+                    <a:latin typeface="+mj-lt"/>
+                  </a:rPr>
+                  <a:t>signal</a:t>
+                </a:r>
+                <a:r>
+                  <a:rPr lang="en-GB" sz="1400" dirty="0">
+                    <a:latin typeface="+mj-lt"/>
+                  </a:rPr>
+                  <a:t> find the </a:t>
+                </a:r>
+                <a:r>
+                  <a:rPr lang="en-GB" sz="1400" b="1" dirty="0">
+                    <a:solidFill>
+                      <a:srgbClr val="C00000"/>
+                    </a:solidFill>
+                    <a:latin typeface="+mj-lt"/>
+                  </a:rPr>
+                  <a:t>QRS</a:t>
+                </a:r>
+                <a:r>
+                  <a:rPr lang="en-GB" sz="1400" dirty="0">
+                    <a:latin typeface="+mj-lt"/>
+                  </a:rPr>
+                  <a:t> position</a:t>
+                </a:r>
+              </a:p>
+              <a:p>
+                <a:r>
+                  <a:rPr lang="en-GB" sz="1400" dirty="0">
+                    <a:latin typeface="+mj-lt"/>
+                  </a:rPr>
+                  <a:t>Then switch to the Rov signal:</a:t>
+                </a:r>
+              </a:p>
+              <a:p>
+                <a:pPr lvl="1"/>
+                <a:r>
+                  <a:rPr lang="en-GB" sz="1400" dirty="0">
+                    <a:latin typeface="+mj-lt"/>
+                  </a:rPr>
+                  <a:t>Define a </a:t>
+                </a:r>
+                <a:r>
+                  <a:rPr lang="en-GB" sz="1400" b="1" dirty="0">
+                    <a:solidFill>
+                      <a:srgbClr val="C00000"/>
+                    </a:solidFill>
+                    <a:latin typeface="+mj-lt"/>
+                  </a:rPr>
+                  <a:t>neighbourhood</a:t>
+                </a:r>
+                <a:r>
+                  <a:rPr lang="en-GB" sz="1400" dirty="0">
+                    <a:latin typeface="+mj-lt"/>
+                  </a:rPr>
+                  <a:t> which contains the QRS position (i.e., QRS is the center) </a:t>
+                </a:r>
+              </a:p>
+              <a:p>
+                <a:pPr marL="457200" lvl="1" indent="0">
+                  <a:buNone/>
+                </a:pPr>
+                <a14:m>
+                  <m:oMathPara xmlns:m="http://schemas.openxmlformats.org/officeDocument/2006/math">
+                    <m:oMathParaPr>
+                      <m:jc m:val="centerGroup"/>
+                    </m:oMathParaPr>
+                    <m:oMath xmlns:m="http://schemas.openxmlformats.org/officeDocument/2006/math">
+                      <m:sSup>
+                        <m:sSupPr>
+                          <m:ctrlPr>
+                            <a:rPr lang="it-IT" sz="1400" b="0" i="1" smtClean="0">
+                              <a:solidFill>
+                                <a:schemeClr val="tx2">
+                                  <a:lumMod val="60000"/>
+                                  <a:lumOff val="40000"/>
+                                </a:schemeClr>
+                              </a:solidFill>
+                              <a:latin typeface="Cambria Math" panose="02040503050406030204" pitchFamily="18" charset="0"/>
+                            </a:rPr>
+                          </m:ctrlPr>
+                        </m:sSupPr>
+                        <m:e>
+                          <m:r>
+                            <a:rPr lang="it-IT" sz="1400" b="0" i="1" smtClean="0">
+                              <a:solidFill>
+                                <a:schemeClr val="tx2">
+                                  <a:lumMod val="60000"/>
+                                  <a:lumOff val="40000"/>
+                                </a:schemeClr>
+                              </a:solidFill>
+                              <a:latin typeface="Cambria Math" panose="02040503050406030204" pitchFamily="18" charset="0"/>
+                            </a:rPr>
+                            <m:t>𝑁</m:t>
+                          </m:r>
+                        </m:e>
+                        <m:sup>
+                          <m:r>
+                            <a:rPr lang="it-IT" sz="1400" b="0" i="1" smtClean="0">
+                              <a:solidFill>
+                                <a:schemeClr val="tx2">
+                                  <a:lumMod val="60000"/>
+                                  <a:lumOff val="40000"/>
+                                </a:schemeClr>
+                              </a:solidFill>
+                              <a:latin typeface="Cambria Math" panose="02040503050406030204" pitchFamily="18" charset="0"/>
+                            </a:rPr>
+                            <m:t>𝑄𝑅𝑆</m:t>
+                          </m:r>
+                        </m:sup>
+                      </m:sSup>
+                      <m:r>
+                        <a:rPr lang="it-IT" sz="1400" b="0" i="1" smtClean="0">
+                          <a:solidFill>
+                            <a:schemeClr val="tx2">
+                              <a:lumMod val="60000"/>
+                              <a:lumOff val="40000"/>
+                            </a:schemeClr>
+                          </a:solidFill>
+                          <a:latin typeface="Cambria Math" panose="02040503050406030204" pitchFamily="18" charset="0"/>
+                        </a:rPr>
+                        <m:t>=</m:t>
+                      </m:r>
+                      <m:d>
+                        <m:dPr>
+                          <m:begChr m:val="["/>
+                          <m:endChr m:val="]"/>
+                          <m:ctrlPr>
+                            <a:rPr lang="it-IT" sz="1400" b="0" i="1" smtClean="0">
+                              <a:solidFill>
+                                <a:schemeClr val="tx2">
+                                  <a:lumMod val="60000"/>
+                                  <a:lumOff val="40000"/>
+                                </a:schemeClr>
+                              </a:solidFill>
+                              <a:latin typeface="Cambria Math" panose="02040503050406030204" pitchFamily="18" charset="0"/>
+                            </a:rPr>
+                          </m:ctrlPr>
+                        </m:dPr>
+                        <m:e>
+                          <m:r>
+                            <a:rPr lang="it-IT" sz="1400" b="0" i="1" smtClean="0">
+                              <a:solidFill>
+                                <a:schemeClr val="tx2">
+                                  <a:lumMod val="60000"/>
+                                  <a:lumOff val="40000"/>
+                                </a:schemeClr>
+                              </a:solidFill>
+                              <a:latin typeface="Cambria Math" panose="02040503050406030204" pitchFamily="18" charset="0"/>
+                            </a:rPr>
+                            <m:t>−</m:t>
+                          </m:r>
+                          <m:f>
+                            <m:fPr>
+                              <m:ctrlPr>
+                                <a:rPr lang="it-IT" sz="1400" b="0" i="1" smtClean="0">
+                                  <a:solidFill>
+                                    <a:schemeClr val="tx2">
+                                      <a:lumMod val="60000"/>
+                                      <a:lumOff val="40000"/>
+                                    </a:schemeClr>
+                                  </a:solidFill>
+                                  <a:latin typeface="Cambria Math" panose="02040503050406030204" pitchFamily="18" charset="0"/>
+                                </a:rPr>
+                              </m:ctrlPr>
+                            </m:fPr>
+                            <m:num>
+                              <m:r>
+                                <a:rPr lang="it-IT" sz="1400" b="0" i="1" smtClean="0">
+                                  <a:solidFill>
+                                    <a:schemeClr val="tx2">
+                                      <a:lumMod val="60000"/>
+                                      <a:lumOff val="40000"/>
+                                    </a:schemeClr>
+                                  </a:solidFill>
+                                  <a:latin typeface="Cambria Math" panose="02040503050406030204" pitchFamily="18" charset="0"/>
+                                </a:rPr>
+                                <m:t>1</m:t>
+                              </m:r>
+                            </m:num>
+                            <m:den>
+                              <m:r>
+                                <a:rPr lang="it-IT" sz="1400" b="0" i="1" smtClean="0">
+                                  <a:solidFill>
+                                    <a:schemeClr val="tx2">
+                                      <a:lumMod val="60000"/>
+                                      <a:lumOff val="40000"/>
+                                    </a:schemeClr>
+                                  </a:solidFill>
+                                  <a:latin typeface="Cambria Math" panose="02040503050406030204" pitchFamily="18" charset="0"/>
+                                </a:rPr>
+                                <m:t>2</m:t>
+                              </m:r>
+                            </m:den>
+                          </m:f>
+                          <m:sSub>
+                            <m:sSubPr>
+                              <m:ctrlPr>
+                                <a:rPr lang="it-IT" sz="1400" b="0" i="1" smtClean="0">
+                                  <a:solidFill>
+                                    <a:schemeClr val="tx2">
+                                      <a:lumMod val="60000"/>
+                                      <a:lumOff val="40000"/>
+                                    </a:schemeClr>
+                                  </a:solidFill>
+                                  <a:latin typeface="Cambria Math" panose="02040503050406030204" pitchFamily="18" charset="0"/>
+                                </a:rPr>
+                              </m:ctrlPr>
+                            </m:sSubPr>
+                            <m:e>
+                              <m:r>
+                                <a:rPr lang="it-IT" sz="1400" b="0" i="1" smtClean="0">
+                                  <a:solidFill>
+                                    <a:schemeClr val="tx2">
+                                      <a:lumMod val="60000"/>
+                                      <a:lumOff val="40000"/>
+                                    </a:schemeClr>
+                                  </a:solidFill>
+                                  <a:latin typeface="Cambria Math" panose="02040503050406030204" pitchFamily="18" charset="0"/>
+                                </a:rPr>
+                                <m:t>𝑡</m:t>
+                              </m:r>
+                            </m:e>
+                            <m:sub>
+                              <m:r>
+                                <a:rPr lang="it-IT" sz="1400" b="0" i="1" smtClean="0">
+                                  <a:solidFill>
+                                    <a:schemeClr val="tx2">
+                                      <a:lumMod val="60000"/>
+                                      <a:lumOff val="40000"/>
+                                    </a:schemeClr>
+                                  </a:solidFill>
+                                  <a:latin typeface="Cambria Math" panose="02040503050406030204" pitchFamily="18" charset="0"/>
+                                </a:rPr>
+                                <m:t>𝑤𝑖𝑛𝑑𝑜𝑤</m:t>
+                              </m:r>
+                            </m:sub>
+                          </m:sSub>
+                          <m:r>
+                            <a:rPr lang="it-IT" sz="1400" b="0" i="1" smtClean="0">
+                              <a:solidFill>
+                                <a:schemeClr val="tx2">
+                                  <a:lumMod val="60000"/>
+                                  <a:lumOff val="40000"/>
+                                </a:schemeClr>
+                              </a:solidFill>
+                              <a:latin typeface="Cambria Math" panose="02040503050406030204" pitchFamily="18" charset="0"/>
+                            </a:rPr>
+                            <m:t>,…,</m:t>
+                          </m:r>
+                          <m:sSub>
+                            <m:sSubPr>
+                              <m:ctrlPr>
+                                <a:rPr lang="it-IT" sz="1400" b="0" i="1" smtClean="0">
+                                  <a:solidFill>
+                                    <a:schemeClr val="tx2">
+                                      <a:lumMod val="60000"/>
+                                      <a:lumOff val="40000"/>
+                                    </a:schemeClr>
+                                  </a:solidFill>
+                                  <a:latin typeface="Cambria Math" panose="02040503050406030204" pitchFamily="18" charset="0"/>
+                                </a:rPr>
+                              </m:ctrlPr>
+                            </m:sSubPr>
+                            <m:e>
+                              <m:r>
+                                <a:rPr lang="it-IT" sz="1400" b="0" i="1" smtClean="0">
+                                  <a:solidFill>
+                                    <a:schemeClr val="tx2">
+                                      <a:lumMod val="60000"/>
+                                      <a:lumOff val="40000"/>
+                                    </a:schemeClr>
+                                  </a:solidFill>
+                                  <a:latin typeface="Cambria Math" panose="02040503050406030204" pitchFamily="18" charset="0"/>
+                                </a:rPr>
+                                <m:t>𝑡</m:t>
+                              </m:r>
+                            </m:e>
+                            <m:sub>
+                              <m:r>
+                                <a:rPr lang="it-IT" sz="1400" b="0" i="1" smtClean="0">
+                                  <a:solidFill>
+                                    <a:schemeClr val="tx2">
+                                      <a:lumMod val="60000"/>
+                                      <a:lumOff val="40000"/>
+                                    </a:schemeClr>
+                                  </a:solidFill>
+                                  <a:latin typeface="Cambria Math" panose="02040503050406030204" pitchFamily="18" charset="0"/>
+                                </a:rPr>
+                                <m:t>𝑄𝑅𝑆</m:t>
+                              </m:r>
+                            </m:sub>
+                          </m:sSub>
+                          <m:r>
+                            <a:rPr lang="it-IT" sz="1400" b="0" i="1" smtClean="0">
+                              <a:solidFill>
+                                <a:schemeClr val="tx2">
+                                  <a:lumMod val="60000"/>
+                                  <a:lumOff val="40000"/>
+                                </a:schemeClr>
+                              </a:solidFill>
+                              <a:latin typeface="Cambria Math" panose="02040503050406030204" pitchFamily="18" charset="0"/>
+                            </a:rPr>
+                            <m:t>,…,+</m:t>
+                          </m:r>
+                          <m:f>
+                            <m:fPr>
+                              <m:ctrlPr>
+                                <a:rPr lang="it-IT" sz="1400" b="0" i="1" smtClean="0">
+                                  <a:solidFill>
+                                    <a:schemeClr val="tx2">
+                                      <a:lumMod val="60000"/>
+                                      <a:lumOff val="40000"/>
+                                    </a:schemeClr>
+                                  </a:solidFill>
+                                  <a:latin typeface="Cambria Math" panose="02040503050406030204" pitchFamily="18" charset="0"/>
+                                </a:rPr>
+                              </m:ctrlPr>
+                            </m:fPr>
+                            <m:num>
+                              <m:r>
+                                <a:rPr lang="it-IT" sz="1400" b="0" i="1" smtClean="0">
+                                  <a:solidFill>
+                                    <a:schemeClr val="tx2">
+                                      <a:lumMod val="60000"/>
+                                      <a:lumOff val="40000"/>
+                                    </a:schemeClr>
+                                  </a:solidFill>
+                                  <a:latin typeface="Cambria Math" panose="02040503050406030204" pitchFamily="18" charset="0"/>
+                                </a:rPr>
+                                <m:t>1</m:t>
+                              </m:r>
+                            </m:num>
+                            <m:den>
+                              <m:r>
+                                <a:rPr lang="it-IT" sz="1400" b="0" i="1" smtClean="0">
+                                  <a:solidFill>
+                                    <a:schemeClr val="tx2">
+                                      <a:lumMod val="60000"/>
+                                      <a:lumOff val="40000"/>
+                                    </a:schemeClr>
+                                  </a:solidFill>
+                                  <a:latin typeface="Cambria Math" panose="02040503050406030204" pitchFamily="18" charset="0"/>
+                                </a:rPr>
+                                <m:t>2</m:t>
+                              </m:r>
+                            </m:den>
+                          </m:f>
+                          <m:sSub>
+                            <m:sSubPr>
+                              <m:ctrlPr>
+                                <a:rPr lang="it-IT" sz="1400" b="0" i="1" smtClean="0">
+                                  <a:solidFill>
+                                    <a:schemeClr val="tx2">
+                                      <a:lumMod val="60000"/>
+                                      <a:lumOff val="40000"/>
+                                    </a:schemeClr>
+                                  </a:solidFill>
+                                  <a:latin typeface="Cambria Math" panose="02040503050406030204" pitchFamily="18" charset="0"/>
+                                </a:rPr>
+                              </m:ctrlPr>
+                            </m:sSubPr>
+                            <m:e>
+                              <m:r>
+                                <a:rPr lang="it-IT" sz="1400" b="0" i="1" smtClean="0">
+                                  <a:solidFill>
+                                    <a:schemeClr val="tx2">
+                                      <a:lumMod val="60000"/>
+                                      <a:lumOff val="40000"/>
+                                    </a:schemeClr>
+                                  </a:solidFill>
+                                  <a:latin typeface="Cambria Math" panose="02040503050406030204" pitchFamily="18" charset="0"/>
+                                </a:rPr>
+                                <m:t>𝑡</m:t>
+                              </m:r>
+                            </m:e>
+                            <m:sub>
+                              <m:r>
+                                <a:rPr lang="it-IT" sz="1400" b="0" i="1" smtClean="0">
+                                  <a:solidFill>
+                                    <a:schemeClr val="tx2">
+                                      <a:lumMod val="60000"/>
+                                      <a:lumOff val="40000"/>
+                                    </a:schemeClr>
+                                  </a:solidFill>
+                                  <a:latin typeface="Cambria Math" panose="02040503050406030204" pitchFamily="18" charset="0"/>
+                                </a:rPr>
+                                <m:t>𝑤𝑖𝑛𝑑𝑜𝑤</m:t>
+                              </m:r>
+                            </m:sub>
+                          </m:sSub>
+                        </m:e>
+                      </m:d>
+                    </m:oMath>
+                  </m:oMathPara>
+                </a14:m>
+                <a:endParaRPr lang="en-GB" sz="1400" dirty="0">
+                  <a:latin typeface="+mj-lt"/>
+                </a:endParaRPr>
+              </a:p>
+              <a:p>
+                <a:pPr marL="457200" lvl="1" indent="0">
+                  <a:buNone/>
+                </a:pPr>
+                <a:r>
+                  <a:rPr lang="en-GB" sz="1100" i="1" dirty="0">
+                    <a:latin typeface="+mj-lt"/>
+                  </a:rPr>
+                  <a:t>Where </a:t>
+                </a:r>
+                <a14:m>
+                  <m:oMath xmlns:m="http://schemas.openxmlformats.org/officeDocument/2006/math">
+                    <m:sSub>
+                      <m:sSubPr>
+                        <m:ctrlPr>
+                          <a:rPr lang="it-IT" sz="1100" b="0" i="1" smtClean="0">
+                            <a:solidFill>
+                              <a:schemeClr val="tx2">
+                                <a:lumMod val="60000"/>
+                                <a:lumOff val="40000"/>
+                              </a:schemeClr>
+                            </a:solidFill>
+                            <a:latin typeface="Cambria Math" panose="02040503050406030204" pitchFamily="18" charset="0"/>
+                          </a:rPr>
+                        </m:ctrlPr>
+                      </m:sSubPr>
+                      <m:e>
+                        <m:r>
+                          <a:rPr lang="it-IT" sz="1100" b="0" i="1" smtClean="0">
+                            <a:solidFill>
+                              <a:schemeClr val="tx2">
+                                <a:lumMod val="60000"/>
+                                <a:lumOff val="40000"/>
+                              </a:schemeClr>
+                            </a:solidFill>
+                            <a:latin typeface="Cambria Math" panose="02040503050406030204" pitchFamily="18" charset="0"/>
+                          </a:rPr>
+                          <m:t>𝑡</m:t>
+                        </m:r>
+                      </m:e>
+                      <m:sub>
+                        <m:r>
+                          <a:rPr lang="it-IT" sz="1100" b="0" i="1" smtClean="0">
+                            <a:solidFill>
+                              <a:schemeClr val="tx2">
+                                <a:lumMod val="60000"/>
+                                <a:lumOff val="40000"/>
+                              </a:schemeClr>
+                            </a:solidFill>
+                            <a:latin typeface="Cambria Math" panose="02040503050406030204" pitchFamily="18" charset="0"/>
+                          </a:rPr>
+                          <m:t>𝑤𝑖𝑛𝑑𝑜𝑤</m:t>
+                        </m:r>
+                      </m:sub>
+                    </m:sSub>
+                  </m:oMath>
+                </a14:m>
+                <a:r>
+                  <a:rPr lang="en-GB" sz="1100" i="1" dirty="0">
+                    <a:latin typeface="+mj-lt"/>
+                  </a:rPr>
+                  <a:t> is the window of time into which searching for the maximum </a:t>
+                </a:r>
+              </a:p>
+              <a:p>
+                <a:pPr lvl="1"/>
+                <a:r>
+                  <a:rPr lang="en-GB" sz="1400" dirty="0">
+                    <a:latin typeface="+mj-lt"/>
+                  </a:rPr>
+                  <a:t>Find the </a:t>
+                </a:r>
+                <a:r>
+                  <a:rPr lang="en-GB" sz="1400" b="1" dirty="0">
+                    <a:solidFill>
+                      <a:srgbClr val="C00000"/>
+                    </a:solidFill>
+                    <a:latin typeface="+mj-lt"/>
+                  </a:rPr>
+                  <a:t>maximum</a:t>
+                </a:r>
+                <a:r>
+                  <a:rPr lang="en-GB" sz="1400" dirty="0">
+                    <a:latin typeface="+mj-lt"/>
+                  </a:rPr>
+                  <a:t> of the neighbourhood: </a:t>
+                </a:r>
+                <a:r>
+                  <a:rPr lang="en-GB" sz="1400" b="1" dirty="0">
+                    <a:solidFill>
+                      <a:srgbClr val="C00000"/>
+                    </a:solidFill>
+                    <a:latin typeface="+mj-lt"/>
+                  </a:rPr>
+                  <a:t>Fiducial Point </a:t>
+                </a:r>
+              </a:p>
+              <a:p>
+                <a:pPr lvl="1"/>
+                <a:r>
+                  <a:rPr lang="en-GB" sz="1400" dirty="0">
+                    <a:latin typeface="+mj-lt"/>
+                  </a:rPr>
+                  <a:t>Compute the </a:t>
+                </a:r>
+                <a:r>
+                  <a:rPr lang="en-GB" sz="1400" b="1" dirty="0">
+                    <a:solidFill>
+                      <a:srgbClr val="0070C0"/>
+                    </a:solidFill>
+                    <a:latin typeface="+mj-lt"/>
+                  </a:rPr>
+                  <a:t>distance</a:t>
+                </a:r>
+                <a:r>
+                  <a:rPr lang="en-GB" sz="1400" dirty="0">
+                    <a:latin typeface="+mj-lt"/>
+                  </a:rPr>
+                  <a:t>: </a:t>
+                </a:r>
+              </a:p>
+              <a:p>
+                <a:pPr marL="457200" lvl="1" indent="0">
+                  <a:buNone/>
+                </a:pPr>
+                <a14:m>
+                  <m:oMathPara xmlns:m="http://schemas.openxmlformats.org/officeDocument/2006/math">
+                    <m:oMathParaPr>
+                      <m:jc m:val="centerGroup"/>
+                    </m:oMathParaPr>
+                    <m:oMath xmlns:m="http://schemas.openxmlformats.org/officeDocument/2006/math">
+                      <m:r>
+                        <a:rPr lang="it-IT" sz="1400" b="0" i="1" smtClean="0">
+                          <a:solidFill>
+                            <a:schemeClr val="tx2">
+                              <a:lumMod val="60000"/>
+                              <a:lumOff val="40000"/>
+                            </a:schemeClr>
+                          </a:solidFill>
+                          <a:latin typeface="Cambria Math" panose="02040503050406030204" pitchFamily="18" charset="0"/>
+                        </a:rPr>
+                        <m:t>𝑑</m:t>
+                      </m:r>
+                      <m:r>
+                        <a:rPr lang="it-IT" sz="1400" b="0" i="1" smtClean="0">
+                          <a:solidFill>
+                            <a:schemeClr val="tx2">
+                              <a:lumMod val="60000"/>
+                              <a:lumOff val="40000"/>
+                            </a:schemeClr>
+                          </a:solidFill>
+                          <a:latin typeface="Cambria Math" panose="02040503050406030204" pitchFamily="18" charset="0"/>
+                        </a:rPr>
+                        <m:t>=</m:t>
+                      </m:r>
+                      <m:r>
+                        <a:rPr lang="it-IT" sz="1400" b="0" i="1" smtClean="0">
+                          <a:solidFill>
+                            <a:schemeClr val="tx2">
+                              <a:lumMod val="60000"/>
+                              <a:lumOff val="40000"/>
+                            </a:schemeClr>
+                          </a:solidFill>
+                          <a:latin typeface="Cambria Math" panose="02040503050406030204" pitchFamily="18" charset="0"/>
+                        </a:rPr>
+                        <m:t>𝑄𝑅</m:t>
+                      </m:r>
+                      <m:sSub>
+                        <m:sSubPr>
+                          <m:ctrlPr>
+                            <a:rPr lang="it-IT" sz="1400" b="0" i="1" smtClean="0">
+                              <a:solidFill>
+                                <a:schemeClr val="tx2">
+                                  <a:lumMod val="60000"/>
+                                  <a:lumOff val="40000"/>
+                                </a:schemeClr>
+                              </a:solidFill>
+                              <a:latin typeface="Cambria Math" panose="02040503050406030204" pitchFamily="18" charset="0"/>
+                            </a:rPr>
+                          </m:ctrlPr>
+                        </m:sSubPr>
+                        <m:e>
+                          <m:r>
+                            <a:rPr lang="it-IT" sz="1400" b="0" i="1" smtClean="0">
+                              <a:solidFill>
+                                <a:schemeClr val="tx2">
+                                  <a:lumMod val="60000"/>
+                                  <a:lumOff val="40000"/>
+                                </a:schemeClr>
+                              </a:solidFill>
+                              <a:latin typeface="Cambria Math" panose="02040503050406030204" pitchFamily="18" charset="0"/>
+                            </a:rPr>
+                            <m:t>𝑆</m:t>
+                          </m:r>
+                        </m:e>
+                        <m:sub>
+                          <m:r>
+                            <a:rPr lang="it-IT" sz="1400" b="0" i="1" smtClean="0">
+                              <a:solidFill>
+                                <a:schemeClr val="tx2">
+                                  <a:lumMod val="60000"/>
+                                  <a:lumOff val="40000"/>
+                                </a:schemeClr>
+                              </a:solidFill>
+                              <a:latin typeface="Cambria Math" panose="02040503050406030204" pitchFamily="18" charset="0"/>
+                            </a:rPr>
+                            <m:t>𝑝𝑜𝑠</m:t>
+                          </m:r>
+                        </m:sub>
+                      </m:sSub>
+                      <m:r>
+                        <a:rPr lang="it-IT" sz="1400" b="0" i="1" smtClean="0">
+                          <a:solidFill>
+                            <a:schemeClr val="tx2">
+                              <a:lumMod val="60000"/>
+                              <a:lumOff val="40000"/>
+                            </a:schemeClr>
+                          </a:solidFill>
+                          <a:latin typeface="Cambria Math" panose="02040503050406030204" pitchFamily="18" charset="0"/>
+                        </a:rPr>
+                        <m:t>−</m:t>
+                      </m:r>
+                      <m:r>
+                        <a:rPr lang="it-IT" sz="1400" b="0" i="1" smtClean="0">
+                          <a:solidFill>
+                            <a:schemeClr val="tx2">
+                              <a:lumMod val="60000"/>
+                              <a:lumOff val="40000"/>
+                            </a:schemeClr>
+                          </a:solidFill>
+                          <a:latin typeface="Cambria Math" panose="02040503050406030204" pitchFamily="18" charset="0"/>
+                        </a:rPr>
+                        <m:t>𝑀𝑎𝑥</m:t>
+                      </m:r>
+                      <m:sSub>
+                        <m:sSubPr>
+                          <m:ctrlPr>
+                            <a:rPr lang="it-IT" sz="1400" b="0" i="1" smtClean="0">
+                              <a:solidFill>
+                                <a:schemeClr val="tx2">
+                                  <a:lumMod val="60000"/>
+                                  <a:lumOff val="40000"/>
+                                </a:schemeClr>
+                              </a:solidFill>
+                              <a:latin typeface="Cambria Math" panose="02040503050406030204" pitchFamily="18" charset="0"/>
+                            </a:rPr>
+                          </m:ctrlPr>
+                        </m:sSubPr>
+                        <m:e>
+                          <m:d>
+                            <m:dPr>
+                              <m:ctrlPr>
+                                <a:rPr lang="it-IT" sz="1400" b="0" i="1" smtClean="0">
+                                  <a:solidFill>
+                                    <a:schemeClr val="tx2">
+                                      <a:lumMod val="60000"/>
+                                      <a:lumOff val="40000"/>
+                                    </a:schemeClr>
+                                  </a:solidFill>
+                                  <a:latin typeface="Cambria Math" panose="02040503050406030204" pitchFamily="18" charset="0"/>
+                                </a:rPr>
+                              </m:ctrlPr>
+                            </m:dPr>
+                            <m:e>
+                              <m:r>
+                                <a:rPr lang="it-IT" sz="1400" b="0" i="1" smtClean="0">
+                                  <a:solidFill>
+                                    <a:schemeClr val="tx2">
+                                      <a:lumMod val="60000"/>
+                                      <a:lumOff val="40000"/>
+                                    </a:schemeClr>
+                                  </a:solidFill>
+                                  <a:latin typeface="Cambria Math" panose="02040503050406030204" pitchFamily="18" charset="0"/>
+                                </a:rPr>
+                                <m:t>𝑁𝑒𝑖𝑔h𝑏𝑜𝑢𝑟h𝑜𝑜𝑑</m:t>
+                              </m:r>
+                            </m:e>
+                          </m:d>
+                        </m:e>
+                        <m:sub>
+                          <m:r>
+                            <a:rPr lang="it-IT" sz="1400" b="0" i="1" smtClean="0">
+                              <a:solidFill>
+                                <a:schemeClr val="tx2">
+                                  <a:lumMod val="60000"/>
+                                  <a:lumOff val="40000"/>
+                                </a:schemeClr>
+                              </a:solidFill>
+                              <a:latin typeface="Cambria Math" panose="02040503050406030204" pitchFamily="18" charset="0"/>
+                            </a:rPr>
+                            <m:t>𝑝𝑜𝑠</m:t>
+                          </m:r>
+                        </m:sub>
+                      </m:sSub>
+                    </m:oMath>
+                  </m:oMathPara>
+                </a14:m>
+                <a:endParaRPr lang="en-GB" sz="1400" dirty="0">
+                  <a:solidFill>
+                    <a:schemeClr val="tx2">
+                      <a:lumMod val="60000"/>
+                      <a:lumOff val="40000"/>
+                    </a:schemeClr>
+                  </a:solidFill>
+                  <a:latin typeface="+mj-lt"/>
+                </a:endParaRPr>
+              </a:p>
+              <a:p>
+                <a:pPr lvl="1"/>
+                <a:r>
+                  <a:rPr lang="en-GB" sz="1400" dirty="0">
+                    <a:latin typeface="+mj-lt"/>
+                  </a:rPr>
+                  <a:t>If the </a:t>
+                </a:r>
+                <a:r>
+                  <a:rPr lang="en-GB" sz="1400" b="1" dirty="0">
+                    <a:solidFill>
+                      <a:srgbClr val="0070C0"/>
+                    </a:solidFill>
+                    <a:latin typeface="+mj-lt"/>
+                  </a:rPr>
+                  <a:t>distance</a:t>
+                </a:r>
+                <a:r>
+                  <a:rPr lang="en-GB" sz="1400" dirty="0">
+                    <a:latin typeface="+mj-lt"/>
+                  </a:rPr>
+                  <a:t> is negative:</a:t>
+                </a:r>
+              </a:p>
+              <a:p>
+                <a:pPr lvl="2"/>
+                <a:r>
+                  <a:rPr lang="en-GB" sz="1100" dirty="0">
+                    <a:latin typeface="+mj-lt"/>
+                  </a:rPr>
+                  <a:t>The QRS is before the maximum </a:t>
+                </a:r>
+                <a:r>
+                  <a:rPr lang="en-GB" sz="1100" dirty="0">
+                    <a:latin typeface="+mj-lt"/>
+                    <a:sym typeface="Wingdings" panose="05000000000000000000" pitchFamily="2" charset="2"/>
+                  </a:rPr>
+                  <a:t> Nan-padding at the end of the signal</a:t>
+                </a:r>
+              </a:p>
+              <a:p>
+                <a:pPr lvl="2"/>
+                <a:endParaRPr lang="en-GB" sz="900" dirty="0">
+                  <a:latin typeface="+mj-lt"/>
+                  <a:sym typeface="Wingdings" panose="05000000000000000000" pitchFamily="2" charset="2"/>
+                </a:endParaRPr>
+              </a:p>
+              <a:p>
+                <a:pPr lvl="1"/>
+                <a:r>
+                  <a:rPr lang="en-GB" sz="1400" dirty="0">
+                    <a:latin typeface="+mj-lt"/>
+                    <a:sym typeface="Wingdings" panose="05000000000000000000" pitchFamily="2" charset="2"/>
+                  </a:rPr>
+                  <a:t>If the </a:t>
+                </a:r>
+                <a:r>
+                  <a:rPr lang="en-GB" sz="1400" b="1" dirty="0">
+                    <a:solidFill>
+                      <a:srgbClr val="0070C0"/>
+                    </a:solidFill>
+                    <a:latin typeface="+mj-lt"/>
+                    <a:sym typeface="Wingdings" panose="05000000000000000000" pitchFamily="2" charset="2"/>
+                  </a:rPr>
+                  <a:t>distance</a:t>
+                </a:r>
+                <a:r>
+                  <a:rPr lang="en-GB" sz="1400" dirty="0">
+                    <a:latin typeface="+mj-lt"/>
+                    <a:sym typeface="Wingdings" panose="05000000000000000000" pitchFamily="2" charset="2"/>
+                  </a:rPr>
+                  <a:t> is positive</a:t>
+                </a:r>
+              </a:p>
+              <a:p>
+                <a:pPr lvl="2"/>
+                <a:r>
+                  <a:rPr lang="en-GB" sz="1100" dirty="0">
+                    <a:latin typeface="+mj-lt"/>
+                    <a:sym typeface="Wingdings" panose="05000000000000000000" pitchFamily="2" charset="2"/>
+                  </a:rPr>
+                  <a:t>The QRS is after the maximum  Nan-padding on top of the signal </a:t>
+                </a:r>
+                <a:endParaRPr lang="en-GB" sz="1100" dirty="0">
+                  <a:latin typeface="+mj-lt"/>
+                </a:endParaRPr>
+              </a:p>
+              <a:p>
+                <a:pPr lvl="1"/>
+                <a:endParaRPr lang="en-GB" sz="1100" dirty="0">
+                  <a:latin typeface="+mj-lt"/>
+                </a:endParaRPr>
+              </a:p>
+              <a:p>
+                <a:pPr marL="0" indent="0">
+                  <a:buNone/>
+                </a:pPr>
+                <a:endParaRPr lang="en-GB" sz="1400" dirty="0">
+                  <a:latin typeface="+mj-lt"/>
+                </a:endParaRPr>
+              </a:p>
+            </p:txBody>
+          </p:sp>
+        </mc:Choice>
+        <mc:Fallback xmlns="">
+          <p:sp>
+            <p:nvSpPr>
+              <p:cNvPr id="6" name="Segnaposto contenuto 2">
+                <a:extLst>
+                  <a:ext uri="{FF2B5EF4-FFF2-40B4-BE49-F238E27FC236}">
+                    <a16:creationId xmlns:a16="http://schemas.microsoft.com/office/drawing/2014/main" id="{D9704C79-DF15-E314-C934-557E33389704}"/>
+                  </a:ext>
+                </a:extLst>
+              </p:cNvPr>
+              <p:cNvSpPr txBox="1">
+                <a:spLocks noRot="1" noChangeAspect="1" noMove="1" noResize="1" noEditPoints="1" noAdjustHandles="1" noChangeArrowheads="1" noChangeShapeType="1" noTextEdit="1"/>
+              </p:cNvSpPr>
+              <p:nvPr/>
+            </p:nvSpPr>
+            <p:spPr>
+              <a:xfrm>
+                <a:off x="360390" y="1525166"/>
+                <a:ext cx="5455194" cy="3924658"/>
+              </a:xfrm>
+              <a:prstGeom prst="rect">
+                <a:avLst/>
+              </a:prstGeom>
+              <a:blipFill>
+                <a:blip r:embed="rId3"/>
+                <a:stretch>
+                  <a:fillRect l="-335" t="-1398" b="-8851"/>
+                </a:stretch>
+              </a:blipFill>
+            </p:spPr>
+            <p:txBody>
+              <a:bodyPr/>
+              <a:lstStyle/>
+              <a:p>
+                <a:r>
+                  <a:rPr lang="it-IT">
+                    <a:noFill/>
+                  </a:rPr>
+                  <a:t> </a:t>
+                </a:r>
+              </a:p>
+            </p:txBody>
+          </p:sp>
+        </mc:Fallback>
+      </mc:AlternateContent>
+      <p:sp>
+        <p:nvSpPr>
+          <p:cNvPr id="5" name="Rettangolo con angoli arrotondati 4">
+            <a:extLst>
+              <a:ext uri="{FF2B5EF4-FFF2-40B4-BE49-F238E27FC236}">
+                <a16:creationId xmlns:a16="http://schemas.microsoft.com/office/drawing/2014/main" id="{B6A4A2D4-B8E4-BD84-D2FA-5C85DFE89FB0}"/>
+              </a:ext>
+            </a:extLst>
+          </p:cNvPr>
+          <p:cNvSpPr/>
+          <p:nvPr/>
+        </p:nvSpPr>
+        <p:spPr>
+          <a:xfrm>
+            <a:off x="360390" y="5833872"/>
+            <a:ext cx="4376201" cy="292608"/>
+          </a:xfrm>
+          <a:prstGeom prst="roundRect">
+            <a:avLst/>
+          </a:prstGeom>
+        </p:spPr>
+        <p:style>
+          <a:lnRef idx="1">
+            <a:schemeClr val="accent4"/>
+          </a:lnRef>
+          <a:fillRef idx="2">
+            <a:schemeClr val="accent4"/>
+          </a:fillRef>
+          <a:effectRef idx="1">
+            <a:schemeClr val="accent4"/>
+          </a:effectRef>
+          <a:fontRef idx="minor">
+            <a:schemeClr val="dk1"/>
+          </a:fontRef>
+        </p:style>
+        <p:txBody>
+          <a:bodyPr rtlCol="0" anchor="ctr"/>
+          <a:lstStyle/>
+          <a:p>
+            <a:r>
+              <a:rPr lang="en-GB" sz="1600" b="1" dirty="0">
+                <a:solidFill>
+                  <a:schemeClr val="accent1"/>
+                </a:solidFill>
+                <a:latin typeface="+mj-lt"/>
+              </a:rPr>
+              <a:t>Hyperparameter: </a:t>
+            </a:r>
+            <a:r>
+              <a:rPr lang="en-GB" sz="1600" dirty="0">
+                <a:latin typeface="+mj-lt"/>
+              </a:rPr>
+              <a:t>Time window: 0.1 s</a:t>
+            </a:r>
+          </a:p>
+        </p:txBody>
+      </p:sp>
+      <p:sp>
+        <p:nvSpPr>
+          <p:cNvPr id="8" name="Rettangolo con angoli arrotondati 7">
+            <a:extLst>
+              <a:ext uri="{FF2B5EF4-FFF2-40B4-BE49-F238E27FC236}">
+                <a16:creationId xmlns:a16="http://schemas.microsoft.com/office/drawing/2014/main" id="{8CEB6B5F-CDD9-8025-E289-299BD2410BDB}"/>
+              </a:ext>
+            </a:extLst>
+          </p:cNvPr>
+          <p:cNvSpPr/>
+          <p:nvPr/>
+        </p:nvSpPr>
+        <p:spPr>
+          <a:xfrm>
+            <a:off x="201168" y="1463040"/>
+            <a:ext cx="5614416" cy="4764024"/>
+          </a:xfrm>
+          <a:prstGeom prst="roundRect">
+            <a:avLst>
+              <a:gd name="adj" fmla="val 7454"/>
+            </a:avLst>
+          </a:prstGeom>
+          <a:noFill/>
+          <a:ln w="28575" cap="flat" cmpd="sng" algn="ctr">
+            <a:solidFill>
+              <a:schemeClr val="accent5"/>
+            </a:solidFill>
+            <a:prstDash val="solid"/>
+            <a:round/>
+            <a:headEnd type="none" w="med" len="med"/>
+            <a:tailEnd type="none" w="med" len="med"/>
+          </a:ln>
+        </p:spPr>
+        <p:style>
+          <a:lnRef idx="0">
+            <a:scrgbClr r="0" g="0" b="0"/>
+          </a:lnRef>
+          <a:fillRef idx="0">
+            <a:scrgbClr r="0" g="0" b="0"/>
+          </a:fillRef>
+          <a:effectRef idx="0">
+            <a:scrgbClr r="0" g="0" b="0"/>
+          </a:effectRef>
+          <a:fontRef idx="minor">
+            <a:schemeClr val="accent5"/>
+          </a:fontRef>
+        </p:style>
+        <p:txBody>
+          <a:bodyPr rtlCol="0" anchor="ctr"/>
+          <a:lstStyle/>
+          <a:p>
+            <a:pPr algn="ctr"/>
+            <a:endParaRPr lang="it-IT"/>
+          </a:p>
+        </p:txBody>
+      </p:sp>
+      <p:sp>
+        <p:nvSpPr>
+          <p:cNvPr id="9" name="Rettangolo con angoli arrotondati 8">
+            <a:extLst>
+              <a:ext uri="{FF2B5EF4-FFF2-40B4-BE49-F238E27FC236}">
+                <a16:creationId xmlns:a16="http://schemas.microsoft.com/office/drawing/2014/main" id="{FB57958F-3DC6-9F71-A38C-903D64B109A1}"/>
+              </a:ext>
+            </a:extLst>
+          </p:cNvPr>
+          <p:cNvSpPr/>
+          <p:nvPr/>
+        </p:nvSpPr>
+        <p:spPr>
+          <a:xfrm>
+            <a:off x="6778754" y="2987331"/>
+            <a:ext cx="4404358" cy="1715441"/>
+          </a:xfrm>
+          <a:prstGeom prst="roundRect">
+            <a:avLst>
+              <a:gd name="adj" fmla="val 7454"/>
+            </a:avLst>
+          </a:prstGeom>
+          <a:noFill/>
+          <a:ln w="28575" cap="flat" cmpd="sng" algn="ctr">
+            <a:solidFill>
+              <a:schemeClr val="accent5"/>
+            </a:solidFill>
+            <a:prstDash val="solid"/>
+            <a:round/>
+            <a:headEnd type="none" w="med" len="med"/>
+            <a:tailEnd type="none" w="med" len="med"/>
+          </a:ln>
+        </p:spPr>
+        <p:style>
+          <a:lnRef idx="0">
+            <a:scrgbClr r="0" g="0" b="0"/>
+          </a:lnRef>
+          <a:fillRef idx="0">
+            <a:scrgbClr r="0" g="0" b="0"/>
+          </a:fillRef>
+          <a:effectRef idx="0">
+            <a:scrgbClr r="0" g="0" b="0"/>
+          </a:effectRef>
+          <a:fontRef idx="minor">
+            <a:schemeClr val="accent5"/>
+          </a:fontRef>
+        </p:style>
+        <p:txBody>
+          <a:bodyPr rtlCol="0" anchor="ctr"/>
+          <a:lstStyle/>
+          <a:p>
+            <a:pPr algn="ctr"/>
+            <a:endParaRPr lang="it-IT"/>
+          </a:p>
+        </p:txBody>
+      </p:sp>
+      <mc:AlternateContent xmlns:mc="http://schemas.openxmlformats.org/markup-compatibility/2006" xmlns:a14="http://schemas.microsoft.com/office/drawing/2010/main">
+        <mc:Choice Requires="a14">
+          <p:sp>
+            <p:nvSpPr>
+              <p:cNvPr id="10" name="Segnaposto contenuto 2">
+                <a:extLst>
+                  <a:ext uri="{FF2B5EF4-FFF2-40B4-BE49-F238E27FC236}">
+                    <a16:creationId xmlns:a16="http://schemas.microsoft.com/office/drawing/2014/main" id="{7A95B7D4-DBAB-15CF-8531-FE96CF1E138C}"/>
+                  </a:ext>
+                </a:extLst>
+              </p:cNvPr>
+              <p:cNvSpPr txBox="1">
+                <a:spLocks/>
+              </p:cNvSpPr>
+              <p:nvPr/>
+            </p:nvSpPr>
+            <p:spPr>
+              <a:xfrm>
+                <a:off x="6959529" y="3034866"/>
+                <a:ext cx="4042808" cy="1620370"/>
+              </a:xfrm>
+              <a:prstGeom prst="rect">
+                <a:avLst/>
+              </a:prstGeom>
+            </p:spPr>
+            <p:txBody>
+              <a:bodyPr vert="horz" lIns="91440" tIns="45720" rIns="91440" bIns="45720" rtlCol="0">
+                <a:noAutofit/>
+              </a:bodyPr>
+              <a:lstStyle>
+                <a:lvl1pPr marL="228600" indent="-228600" algn="l" defTabSz="914400" rtl="0" eaLnBrk="1" latinLnBrk="0" hangingPunct="1">
+                  <a:lnSpc>
+                    <a:spcPct val="90000"/>
+                  </a:lnSpc>
+                  <a:spcBef>
+                    <a:spcPts val="1000"/>
+                  </a:spcBef>
+                  <a:buFont typeface="Arial" panose="020B0604020202020204" pitchFamily="34" charset="0"/>
+                  <a:buChar char="•"/>
+                  <a:defRPr sz="2800" kern="1200">
+                    <a:solidFill>
+                      <a:schemeClr val="tx1"/>
+                    </a:solidFill>
+                    <a:latin typeface="+mn-lt"/>
+                    <a:ea typeface="+mn-ea"/>
+                    <a:cs typeface="+mn-cs"/>
+                  </a:defRPr>
+                </a:lvl1pPr>
+                <a:lvl2pPr marL="685800" indent="-228600" algn="l" defTabSz="914400" rtl="0" eaLnBrk="1" latinLnBrk="0" hangingPunct="1">
+                  <a:lnSpc>
+                    <a:spcPct val="90000"/>
+                  </a:lnSpc>
+                  <a:spcBef>
+                    <a:spcPts val="500"/>
+                  </a:spcBef>
+                  <a:buFont typeface="Arial" panose="020B0604020202020204" pitchFamily="34" charset="0"/>
+                  <a:buChar char="•"/>
+                  <a:defRPr sz="2400" kern="1200">
+                    <a:solidFill>
+                      <a:schemeClr val="tx1"/>
+                    </a:solidFill>
+                    <a:latin typeface="+mn-lt"/>
+                    <a:ea typeface="+mn-ea"/>
+                    <a:cs typeface="+mn-cs"/>
+                  </a:defRPr>
+                </a:lvl2pPr>
+                <a:lvl3pPr marL="1143000" indent="-228600" algn="l" defTabSz="914400" rtl="0" eaLnBrk="1" latinLnBrk="0" hangingPunct="1">
+                  <a:lnSpc>
+                    <a:spcPct val="90000"/>
+                  </a:lnSpc>
+                  <a:spcBef>
+                    <a:spcPts val="500"/>
+                  </a:spcBef>
+                  <a:buFont typeface="Arial" panose="020B0604020202020204" pitchFamily="34" charset="0"/>
+                  <a:buChar char="•"/>
+                  <a:defRPr sz="2000" kern="1200">
+                    <a:solidFill>
+                      <a:schemeClr val="tx1"/>
+                    </a:solidFill>
+                    <a:latin typeface="+mn-lt"/>
+                    <a:ea typeface="+mn-ea"/>
+                    <a:cs typeface="+mn-cs"/>
+                  </a:defRPr>
+                </a:lvl3pPr>
+                <a:lvl4pPr marL="1600200" indent="-228600" algn="l" defTabSz="914400" rtl="0" eaLnBrk="1" latinLnBrk="0" hangingPunct="1">
+                  <a:lnSpc>
+                    <a:spcPct val="90000"/>
+                  </a:lnSpc>
+                  <a:spcBef>
+                    <a:spcPts val="500"/>
+                  </a:spcBef>
+                  <a:buFont typeface="Arial" panose="020B0604020202020204" pitchFamily="34" charset="0"/>
+                  <a:buChar char="•"/>
+                  <a:defRPr sz="1800" kern="1200">
+                    <a:solidFill>
+                      <a:schemeClr val="tx1"/>
+                    </a:solidFill>
+                    <a:latin typeface="+mn-lt"/>
+                    <a:ea typeface="+mn-ea"/>
+                    <a:cs typeface="+mn-cs"/>
+                  </a:defRPr>
+                </a:lvl4pPr>
+                <a:lvl5pPr marL="2057400" indent="-228600" algn="l" defTabSz="914400" rtl="0" eaLnBrk="1" latinLnBrk="0" hangingPunct="1">
+                  <a:lnSpc>
+                    <a:spcPct val="90000"/>
+                  </a:lnSpc>
+                  <a:spcBef>
+                    <a:spcPts val="500"/>
+                  </a:spcBef>
+                  <a:buFont typeface="Arial" panose="020B0604020202020204" pitchFamily="34" charset="0"/>
+                  <a:buChar char="•"/>
+                  <a:defRPr sz="1800" kern="1200">
+                    <a:solidFill>
+                      <a:schemeClr val="tx1"/>
+                    </a:solidFill>
+                    <a:latin typeface="+mn-lt"/>
+                    <a:ea typeface="+mn-ea"/>
+                    <a:cs typeface="+mn-cs"/>
+                  </a:defRPr>
+                </a:lvl5pPr>
+                <a:lvl6pPr marL="2514600" indent="-228600" algn="l" defTabSz="914400" rtl="0" eaLnBrk="1" latinLnBrk="0" hangingPunct="1">
+                  <a:lnSpc>
+                    <a:spcPct val="90000"/>
+                  </a:lnSpc>
+                  <a:spcBef>
+                    <a:spcPts val="500"/>
+                  </a:spcBef>
+                  <a:buFont typeface="Arial" panose="020B0604020202020204" pitchFamily="34" charset="0"/>
+                  <a:buChar char="•"/>
+                  <a:defRPr sz="1800" kern="1200">
+                    <a:solidFill>
+                      <a:schemeClr val="tx1"/>
+                    </a:solidFill>
+                    <a:latin typeface="+mn-lt"/>
+                    <a:ea typeface="+mn-ea"/>
+                    <a:cs typeface="+mn-cs"/>
+                  </a:defRPr>
+                </a:lvl6pPr>
+                <a:lvl7pPr marL="2971800" indent="-228600" algn="l" defTabSz="914400" rtl="0" eaLnBrk="1" latinLnBrk="0" hangingPunct="1">
+                  <a:lnSpc>
+                    <a:spcPct val="90000"/>
+                  </a:lnSpc>
+                  <a:spcBef>
+                    <a:spcPts val="500"/>
+                  </a:spcBef>
+                  <a:buFont typeface="Arial" panose="020B0604020202020204" pitchFamily="34" charset="0"/>
+                  <a:buChar char="•"/>
+                  <a:defRPr sz="1800" kern="1200">
+                    <a:solidFill>
+                      <a:schemeClr val="tx1"/>
+                    </a:solidFill>
+                    <a:latin typeface="+mn-lt"/>
+                    <a:ea typeface="+mn-ea"/>
+                    <a:cs typeface="+mn-cs"/>
+                  </a:defRPr>
+                </a:lvl7pPr>
+                <a:lvl8pPr marL="3429000" indent="-228600" algn="l" defTabSz="914400" rtl="0" eaLnBrk="1" latinLnBrk="0" hangingPunct="1">
+                  <a:lnSpc>
+                    <a:spcPct val="90000"/>
+                  </a:lnSpc>
+                  <a:spcBef>
+                    <a:spcPts val="500"/>
+                  </a:spcBef>
+                  <a:buFont typeface="Arial" panose="020B0604020202020204" pitchFamily="34" charset="0"/>
+                  <a:buChar char="•"/>
+                  <a:defRPr sz="1800" kern="1200">
+                    <a:solidFill>
+                      <a:schemeClr val="tx1"/>
+                    </a:solidFill>
+                    <a:latin typeface="+mn-lt"/>
+                    <a:ea typeface="+mn-ea"/>
+                    <a:cs typeface="+mn-cs"/>
+                  </a:defRPr>
+                </a:lvl8pPr>
+                <a:lvl9pPr marL="3886200" indent="-228600" algn="l" defTabSz="914400" rtl="0" eaLnBrk="1" latinLnBrk="0" hangingPunct="1">
+                  <a:lnSpc>
+                    <a:spcPct val="90000"/>
+                  </a:lnSpc>
+                  <a:spcBef>
+                    <a:spcPts val="500"/>
+                  </a:spcBef>
+                  <a:buFont typeface="Arial" panose="020B0604020202020204" pitchFamily="34" charset="0"/>
+                  <a:buChar char="•"/>
+                  <a:defRPr sz="1800" kern="1200">
+                    <a:solidFill>
+                      <a:schemeClr val="tx1"/>
+                    </a:solidFill>
+                    <a:latin typeface="+mn-lt"/>
+                    <a:ea typeface="+mn-ea"/>
+                    <a:cs typeface="+mn-cs"/>
+                  </a:defRPr>
+                </a:lvl9pPr>
+              </a:lstStyle>
+              <a:p>
+                <a:pPr marL="0" indent="0" algn="ctr">
+                  <a:buNone/>
+                </a:pPr>
+                <a:r>
+                  <a:rPr lang="en-GB" sz="1800" b="1" dirty="0">
+                    <a:latin typeface="+mj-lt"/>
+                  </a:rPr>
+                  <a:t>Whole dataset alignment</a:t>
+                </a:r>
+              </a:p>
+              <a:p>
+                <a:r>
+                  <a:rPr lang="en-GB" sz="1400" dirty="0">
+                    <a:latin typeface="+mj-lt"/>
+                  </a:rPr>
+                  <a:t>Define a time instant respect which align: </a:t>
+                </a:r>
+                <a14:m>
+                  <m:oMath xmlns:m="http://schemas.openxmlformats.org/officeDocument/2006/math">
+                    <m:sSub>
+                      <m:sSubPr>
+                        <m:ctrlPr>
+                          <a:rPr lang="it-IT" sz="1400" b="0" i="1" smtClean="0">
+                            <a:latin typeface="Cambria Math" panose="02040503050406030204" pitchFamily="18" charset="0"/>
+                          </a:rPr>
+                        </m:ctrlPr>
+                      </m:sSubPr>
+                      <m:e>
+                        <m:r>
+                          <a:rPr lang="it-IT" sz="1400" b="0" i="1" smtClean="0">
+                            <a:latin typeface="Cambria Math" panose="02040503050406030204" pitchFamily="18" charset="0"/>
+                          </a:rPr>
+                          <m:t>𝐼</m:t>
+                        </m:r>
+                      </m:e>
+                      <m:sub>
+                        <m:r>
+                          <a:rPr lang="it-IT" sz="1400" b="0" i="1" smtClean="0">
+                            <a:latin typeface="Cambria Math" panose="02040503050406030204" pitchFamily="18" charset="0"/>
+                          </a:rPr>
+                          <m:t>𝑡𝑖𝑚𝑒</m:t>
+                        </m:r>
+                      </m:sub>
+                    </m:sSub>
+                  </m:oMath>
+                </a14:m>
+                <a:r>
+                  <a:rPr lang="it-IT" sz="1400" b="0" dirty="0">
+                    <a:latin typeface="+mj-lt"/>
+                  </a:rPr>
+                  <a:t> (e.g., </a:t>
+                </a:r>
+                <a14:m>
+                  <m:oMath xmlns:m="http://schemas.openxmlformats.org/officeDocument/2006/math">
+                    <m:sSub>
+                      <m:sSubPr>
+                        <m:ctrlPr>
+                          <a:rPr lang="it-IT" sz="1400" i="1">
+                            <a:latin typeface="Cambria Math" panose="02040503050406030204" pitchFamily="18" charset="0"/>
+                          </a:rPr>
+                        </m:ctrlPr>
+                      </m:sSubPr>
+                      <m:e>
+                        <m:r>
+                          <a:rPr lang="it-IT" sz="1400" i="1">
+                            <a:latin typeface="Cambria Math" panose="02040503050406030204" pitchFamily="18" charset="0"/>
+                          </a:rPr>
+                          <m:t>𝐼</m:t>
+                        </m:r>
+                      </m:e>
+                      <m:sub>
+                        <m:r>
+                          <a:rPr lang="it-IT" sz="1400" b="0" i="1" smtClean="0">
+                            <a:latin typeface="Cambria Math" panose="02040503050406030204" pitchFamily="18" charset="0"/>
+                          </a:rPr>
+                          <m:t>0.5</m:t>
+                        </m:r>
+                      </m:sub>
+                    </m:sSub>
+                  </m:oMath>
+                </a14:m>
+                <a:r>
+                  <a:rPr lang="it-IT" sz="1400" b="0" dirty="0">
+                    <a:latin typeface="+mj-lt"/>
+                  </a:rPr>
+                  <a:t>)</a:t>
+                </a:r>
+                <a:endParaRPr lang="en-GB" sz="1400" dirty="0">
+                  <a:latin typeface="+mj-lt"/>
+                </a:endParaRPr>
+              </a:p>
+              <a:p>
+                <a:pPr marL="0" indent="0">
+                  <a:buNone/>
+                </a:pPr>
+                <a:r>
+                  <a:rPr lang="en-GB" sz="1400" dirty="0">
+                    <a:latin typeface="+mj-lt"/>
+                  </a:rPr>
+                  <a:t>For each signal:</a:t>
+                </a:r>
+              </a:p>
+              <a:p>
+                <a:r>
+                  <a:rPr lang="en-GB" sz="1400" dirty="0">
+                    <a:latin typeface="+mj-lt"/>
+                  </a:rPr>
+                  <a:t>Align the Fiducial Point respect to </a:t>
+                </a:r>
+                <a14:m>
+                  <m:oMath xmlns:m="http://schemas.openxmlformats.org/officeDocument/2006/math">
+                    <m:sSub>
+                      <m:sSubPr>
+                        <m:ctrlPr>
+                          <a:rPr lang="it-IT" sz="1400" b="0" i="1" smtClean="0">
+                            <a:latin typeface="Cambria Math" panose="02040503050406030204" pitchFamily="18" charset="0"/>
+                          </a:rPr>
+                        </m:ctrlPr>
+                      </m:sSubPr>
+                      <m:e>
+                        <m:r>
+                          <a:rPr lang="it-IT" sz="1400" b="0" i="1" smtClean="0">
+                            <a:latin typeface="Cambria Math" panose="02040503050406030204" pitchFamily="18" charset="0"/>
+                          </a:rPr>
+                          <m:t>𝐼</m:t>
+                        </m:r>
+                      </m:e>
+                      <m:sub>
+                        <m:r>
+                          <a:rPr lang="it-IT" sz="1400" b="0" i="1" smtClean="0">
+                            <a:latin typeface="Cambria Math" panose="02040503050406030204" pitchFamily="18" charset="0"/>
+                          </a:rPr>
+                          <m:t>𝑡𝑖𝑚𝑒</m:t>
+                        </m:r>
+                      </m:sub>
+                    </m:sSub>
+                  </m:oMath>
+                </a14:m>
+                <a:endParaRPr lang="en-GB" sz="1400" dirty="0">
+                  <a:latin typeface="+mj-lt"/>
+                </a:endParaRPr>
+              </a:p>
+            </p:txBody>
+          </p:sp>
+        </mc:Choice>
+        <mc:Fallback xmlns="">
+          <p:sp>
+            <p:nvSpPr>
+              <p:cNvPr id="10" name="Segnaposto contenuto 2">
+                <a:extLst>
+                  <a:ext uri="{FF2B5EF4-FFF2-40B4-BE49-F238E27FC236}">
+                    <a16:creationId xmlns:a16="http://schemas.microsoft.com/office/drawing/2014/main" id="{7A95B7D4-DBAB-15CF-8531-FE96CF1E138C}"/>
+                  </a:ext>
+                </a:extLst>
+              </p:cNvPr>
+              <p:cNvSpPr txBox="1">
+                <a:spLocks noRot="1" noChangeAspect="1" noMove="1" noResize="1" noEditPoints="1" noAdjustHandles="1" noChangeArrowheads="1" noChangeShapeType="1" noTextEdit="1"/>
+              </p:cNvSpPr>
+              <p:nvPr/>
+            </p:nvSpPr>
+            <p:spPr>
+              <a:xfrm>
+                <a:off x="6959529" y="3034866"/>
+                <a:ext cx="4042808" cy="1620370"/>
+              </a:xfrm>
+              <a:prstGeom prst="rect">
+                <a:avLst/>
+              </a:prstGeom>
+              <a:blipFill>
+                <a:blip r:embed="rId4"/>
+                <a:stretch>
+                  <a:fillRect l="-452" t="-3759"/>
+                </a:stretch>
+              </a:blipFill>
+            </p:spPr>
+            <p:txBody>
+              <a:bodyPr/>
+              <a:lstStyle/>
+              <a:p>
+                <a:r>
+                  <a:rPr lang="it-IT">
+                    <a:noFill/>
+                  </a:rPr>
+                  <a:t> </a:t>
+                </a:r>
+              </a:p>
+            </p:txBody>
+          </p:sp>
+        </mc:Fallback>
+      </mc:AlternateContent>
+      <p:sp>
+        <p:nvSpPr>
+          <p:cNvPr id="11" name="Freccia a destra 10">
+            <a:extLst>
+              <a:ext uri="{FF2B5EF4-FFF2-40B4-BE49-F238E27FC236}">
+                <a16:creationId xmlns:a16="http://schemas.microsoft.com/office/drawing/2014/main" id="{03A315CE-2F06-9554-EFF9-2D60511A65D5}"/>
+              </a:ext>
+            </a:extLst>
+          </p:cNvPr>
+          <p:cNvSpPr/>
+          <p:nvPr/>
+        </p:nvSpPr>
+        <p:spPr>
+          <a:xfrm>
+            <a:off x="5980176" y="3730752"/>
+            <a:ext cx="685800" cy="301752"/>
+          </a:xfrm>
+          <a:prstGeom prst="rightArrow">
+            <a:avLst/>
+          </a:prstGeom>
+        </p:spPr>
+        <p:style>
+          <a:lnRef idx="3">
+            <a:schemeClr val="lt1"/>
+          </a:lnRef>
+          <a:fillRef idx="1">
+            <a:schemeClr val="accent5"/>
+          </a:fillRef>
+          <a:effectRef idx="1">
+            <a:schemeClr val="accent5"/>
+          </a:effectRef>
+          <a:fontRef idx="minor">
+            <a:schemeClr val="lt1"/>
+          </a:fontRef>
+        </p:style>
+        <p:txBody>
+          <a:bodyPr rtlCol="0" anchor="ctr"/>
+          <a:lstStyle/>
+          <a:p>
+            <a:pPr algn="ctr"/>
+            <a:endParaRPr lang="it-IT"/>
+          </a:p>
+        </p:txBody>
+      </p:sp>
+    </p:spTree>
+    <p:extLst>
+      <p:ext uri="{BB962C8B-B14F-4D97-AF65-F5344CB8AC3E}">
+        <p14:creationId xmlns:p14="http://schemas.microsoft.com/office/powerpoint/2010/main" val="4269913508"/>
       </p:ext>
     </p:extLst>
   </p:cSld>
@@ -18638,6 +22386,18 @@
                 </a:solidFill>
               </a:rPr>
               <a:t>Signals alignment </a:t>
+            </a:r>
+          </a:p>
+          <a:p>
+            <a:r>
+              <a:rPr lang="en-US" sz="2000" dirty="0">
+                <a:solidFill>
+                  <a:schemeClr val="bg2">
+                    <a:lumMod val="75000"/>
+                  </a:schemeClr>
+                </a:solidFill>
+              </a:rPr>
+              <a:t>Possible features of Rov Signals</a:t>
             </a:r>
           </a:p>
           <a:p>
@@ -19849,6 +23609,18 @@
                 </a:solidFill>
               </a:rPr>
               <a:t>Signals alignment </a:t>
+            </a:r>
+          </a:p>
+          <a:p>
+            <a:r>
+              <a:rPr lang="en-US" sz="2000" dirty="0">
+                <a:solidFill>
+                  <a:schemeClr val="bg2">
+                    <a:lumMod val="75000"/>
+                  </a:schemeClr>
+                </a:solidFill>
+              </a:rPr>
+              <a:t>Possible features of Rov Signals</a:t>
             </a:r>
           </a:p>
           <a:p>
@@ -24873,6 +28645,18 @@
                   </a:schemeClr>
                 </a:solidFill>
               </a:rPr>
+              <a:t>Possible features of Rov Signals</a:t>
+            </a:r>
+          </a:p>
+          <a:p>
+            <a:r>
+              <a:rPr lang="en-US" sz="2000" dirty="0">
+                <a:solidFill>
+                  <a:schemeClr val="bg2">
+                    <a:lumMod val="75000"/>
+                  </a:schemeClr>
+                </a:solidFill>
+              </a:rPr>
               <a:t>Conclusions</a:t>
             </a:r>
             <a:endParaRPr lang="en-US" sz="1600" dirty="0">

</xml_diff>